<commit_message>
included future goals slide
</commit_message>
<xml_diff>
--- a/DSE 6300- Project Presentation.pptx
+++ b/DSE 6300- Project Presentation.pptx
@@ -5,7 +5,7 @@
     <p:sldMasterId id="2147483678" r:id="rId1"/>
   </p:sldMasterIdLst>
   <p:notesMasterIdLst>
-    <p:notesMasterId r:id="rId16"/>
+    <p:notesMasterId r:id="rId17"/>
   </p:notesMasterIdLst>
   <p:sldIdLst>
     <p:sldId id="256" r:id="rId2"/>
@@ -21,7 +21,8 @@
     <p:sldId id="263" r:id="rId12"/>
     <p:sldId id="264" r:id="rId13"/>
     <p:sldId id="265" r:id="rId14"/>
-    <p:sldId id="266" r:id="rId15"/>
+    <p:sldId id="274" r:id="rId15"/>
+    <p:sldId id="266" r:id="rId16"/>
   </p:sldIdLst>
   <p:sldSz cx="12192000" cy="6858000"/>
   <p:notesSz cx="6858000" cy="9144000"/>
@@ -139,6 +140,74 @@
 </p:presentation>
 </file>
 
+<file path=ppt/revisionInfo.xml><?xml version="1.0" encoding="utf-8"?>
+<p1510:revInfo xmlns:a="http://schemas.openxmlformats.org/drawingml/2006/main" xmlns:r="http://schemas.openxmlformats.org/officeDocument/2006/relationships" xmlns:p1510="http://schemas.microsoft.com/office/powerpoint/2015/10/main">
+  <p1510:revLst>
+    <p1510:client id="{3E48295F-6FF2-45A6-A770-0FE45C64B4F9}" v="2" dt="2022-04-25T14:13:08.056"/>
+  </p1510:revLst>
+</p1510:revInfo>
+</file>
+
+<file path=ppt/changesInfos/changesInfo1.xml><?xml version="1.0" encoding="utf-8"?>
+<pc:chgInfo xmlns:a="http://schemas.openxmlformats.org/drawingml/2006/main" xmlns:r="http://schemas.openxmlformats.org/officeDocument/2006/relationships" xmlns:ac="http://schemas.microsoft.com/office/drawing/2013/main/command" xmlns:pc="http://schemas.microsoft.com/office/powerpoint/2013/main/command">
+  <pc:docChgLst>
+    <pc:chgData name="Priya Pichai" userId="24548fc4fd954468" providerId="LiveId" clId="{3E48295F-6FF2-45A6-A770-0FE45C64B4F9}"/>
+    <pc:docChg chg="addSld modSld">
+      <pc:chgData name="Priya Pichai" userId="24548fc4fd954468" providerId="LiveId" clId="{3E48295F-6FF2-45A6-A770-0FE45C64B4F9}" dt="2022-04-25T14:16:22.888" v="116" actId="255"/>
+      <pc:docMkLst>
+        <pc:docMk/>
+      </pc:docMkLst>
+      <pc:sldChg chg="modSp mod">
+        <pc:chgData name="Priya Pichai" userId="24548fc4fd954468" providerId="LiveId" clId="{3E48295F-6FF2-45A6-A770-0FE45C64B4F9}" dt="2022-04-25T14:01:32.669" v="0" actId="20577"/>
+        <pc:sldMkLst>
+          <pc:docMk/>
+          <pc:sldMk cId="511202775" sldId="256"/>
+        </pc:sldMkLst>
+        <pc:spChg chg="mod">
+          <ac:chgData name="Priya Pichai" userId="24548fc4fd954468" providerId="LiveId" clId="{3E48295F-6FF2-45A6-A770-0FE45C64B4F9}" dt="2022-04-25T14:01:32.669" v="0" actId="20577"/>
+          <ac:spMkLst>
+            <pc:docMk/>
+            <pc:sldMk cId="511202775" sldId="256"/>
+            <ac:spMk id="3" creationId="{00000000-0000-0000-0000-000000000000}"/>
+          </ac:spMkLst>
+        </pc:spChg>
+      </pc:sldChg>
+      <pc:sldChg chg="addSp delSp modSp add mod">
+        <pc:chgData name="Priya Pichai" userId="24548fc4fd954468" providerId="LiveId" clId="{3E48295F-6FF2-45A6-A770-0FE45C64B4F9}" dt="2022-04-25T14:16:22.888" v="116" actId="255"/>
+        <pc:sldMkLst>
+          <pc:docMk/>
+          <pc:sldMk cId="2856388626" sldId="274"/>
+        </pc:sldMkLst>
+        <pc:spChg chg="mod">
+          <ac:chgData name="Priya Pichai" userId="24548fc4fd954468" providerId="LiveId" clId="{3E48295F-6FF2-45A6-A770-0FE45C64B4F9}" dt="2022-04-25T14:12:53.776" v="39" actId="20577"/>
+          <ac:spMkLst>
+            <pc:docMk/>
+            <pc:sldMk cId="2856388626" sldId="274"/>
+            <ac:spMk id="2" creationId="{00000000-0000-0000-0000-000000000000}"/>
+          </ac:spMkLst>
+        </pc:spChg>
+        <pc:spChg chg="add mod">
+          <ac:chgData name="Priya Pichai" userId="24548fc4fd954468" providerId="LiveId" clId="{3E48295F-6FF2-45A6-A770-0FE45C64B4F9}" dt="2022-04-25T14:16:22.888" v="116" actId="255"/>
+          <ac:spMkLst>
+            <pc:docMk/>
+            <pc:sldMk cId="2856388626" sldId="274"/>
+            <ac:spMk id="3" creationId="{E8E56DEB-1EDF-4218-92F3-85CA8ADE9895}"/>
+          </ac:spMkLst>
+        </pc:spChg>
+        <pc:spChg chg="del mod">
+          <ac:chgData name="Priya Pichai" userId="24548fc4fd954468" providerId="LiveId" clId="{3E48295F-6FF2-45A6-A770-0FE45C64B4F9}" dt="2022-04-25T14:12:55.230" v="41"/>
+          <ac:spMkLst>
+            <pc:docMk/>
+            <pc:sldMk cId="2856388626" sldId="274"/>
+            <ac:spMk id="4" creationId="{00000000-0000-0000-0000-000000000000}"/>
+          </ac:spMkLst>
+        </pc:spChg>
+      </pc:sldChg>
+    </pc:docChg>
+  </pc:docChgLst>
+</pc:chgInfo>
+</file>
+
 <file path=ppt/notesMasters/notesMaster1.xml><?xml version="1.0" encoding="utf-8"?>
 <p:notesMaster xmlns:a="http://schemas.openxmlformats.org/drawingml/2006/main" xmlns:r="http://schemas.openxmlformats.org/officeDocument/2006/relationships" xmlns:p="http://schemas.openxmlformats.org/presentationml/2006/main">
   <p:cSld>
@@ -221,7 +290,7 @@
           <a:p>
             <a:fld id="{912BF297-3D07-4118-B915-1667A1AC3BEE}" type="datetimeFigureOut">
               <a:rPr lang="en-US" smtClean="0"/>
-              <a:t>4/23/2022</a:t>
+              <a:t>4/25/2022</a:t>
             </a:fld>
             <a:endParaRPr lang="en-US"/>
           </a:p>
@@ -285,38 +354,37 @@
           <a:p>
             <a:pPr lvl="0"/>
             <a:r>
-              <a:rPr lang="en-US" smtClean="0"/>
+              <a:rPr lang="en-US"/>
               <a:t>Click to edit Master text styles</a:t>
             </a:r>
           </a:p>
           <a:p>
             <a:pPr lvl="1"/>
             <a:r>
-              <a:rPr lang="en-US" smtClean="0"/>
+              <a:rPr lang="en-US"/>
               <a:t>Second level</a:t>
             </a:r>
           </a:p>
           <a:p>
             <a:pPr lvl="2"/>
             <a:r>
-              <a:rPr lang="en-US" smtClean="0"/>
+              <a:rPr lang="en-US"/>
               <a:t>Third level</a:t>
             </a:r>
           </a:p>
           <a:p>
             <a:pPr lvl="3"/>
             <a:r>
-              <a:rPr lang="en-US" smtClean="0"/>
+              <a:rPr lang="en-US"/>
               <a:t>Fourth level</a:t>
             </a:r>
           </a:p>
           <a:p>
             <a:pPr lvl="4"/>
             <a:r>
-              <a:rPr lang="en-US" smtClean="0"/>
+              <a:rPr lang="en-US"/>
               <a:t>Fifth level</a:t>
             </a:r>
-            <a:endParaRPr lang="en-US"/>
           </a:p>
         </p:txBody>
       </p:sp>
@@ -932,7 +1000,7 @@
           </a:lstStyle>
           <a:p>
             <a:r>
-              <a:rPr lang="en-US" smtClean="0"/>
+              <a:rPr lang="en-US"/>
               <a:t>Click to edit Master title style</a:t>
             </a:r>
             <a:endParaRPr lang="en-US" dirty="0"/>
@@ -1051,7 +1119,7 @@
           </a:lstStyle>
           <a:p>
             <a:r>
-              <a:rPr lang="en-US" smtClean="0"/>
+              <a:rPr lang="en-US"/>
               <a:t>Click to edit Master subtitle style</a:t>
             </a:r>
             <a:endParaRPr lang="en-US" dirty="0"/>
@@ -1075,7 +1143,7 @@
           <a:p>
             <a:fld id="{4BF1FF1A-9F5E-40D9-8453-DB8198BC6686}" type="datetime1">
               <a:rPr lang="en-US" smtClean="0"/>
-              <a:t>4/23/2022</a:t>
+              <a:t>4/25/2022</a:t>
             </a:fld>
             <a:endParaRPr lang="en-US"/>
           </a:p>
@@ -1185,7 +1253,7 @@
           </a:lstStyle>
           <a:p>
             <a:r>
-              <a:rPr lang="en-US" smtClean="0"/>
+              <a:rPr lang="en-US"/>
               <a:t>Click to edit Master title style</a:t>
             </a:r>
             <a:endParaRPr lang="en-US" dirty="0"/>
@@ -1280,7 +1348,7 @@
           </a:lstStyle>
           <a:p>
             <a:r>
-              <a:rPr lang="en-US" smtClean="0"/>
+              <a:rPr lang="en-US"/>
               <a:t>Click icon to add picture</a:t>
             </a:r>
             <a:endParaRPr lang="en-US" dirty="0"/>
@@ -1348,7 +1416,7 @@
           <a:p>
             <a:pPr lvl="0"/>
             <a:r>
-              <a:rPr lang="en-US" smtClean="0"/>
+              <a:rPr lang="en-US"/>
               <a:t>Click to edit Master text styles</a:t>
             </a:r>
           </a:p>
@@ -1371,7 +1439,7 @@
           <a:p>
             <a:fld id="{D7A3863A-CCEC-45B1-B0AE-2444D99B5F3D}" type="datetime1">
               <a:rPr lang="en-US" smtClean="0"/>
-              <a:t>4/23/2022</a:t>
+              <a:t>4/25/2022</a:t>
             </a:fld>
             <a:endParaRPr lang="en-US"/>
           </a:p>
@@ -1476,7 +1544,7 @@
           </a:lstStyle>
           <a:p>
             <a:r>
-              <a:rPr lang="en-US" smtClean="0"/>
+              <a:rPr lang="en-US"/>
               <a:t>Click to edit Master title style</a:t>
             </a:r>
             <a:endParaRPr lang="en-US" dirty="0"/>
@@ -1596,7 +1664,7 @@
           <a:p>
             <a:pPr lvl="0"/>
             <a:r>
-              <a:rPr lang="en-US" smtClean="0"/>
+              <a:rPr lang="en-US"/>
               <a:t>Click to edit Master text styles</a:t>
             </a:r>
           </a:p>
@@ -1619,7 +1687,7 @@
           <a:p>
             <a:fld id="{DB39090A-01B4-4495-A157-5589BD10BE03}" type="datetime1">
               <a:rPr lang="en-US" smtClean="0"/>
-              <a:t>4/23/2022</a:t>
+              <a:t>4/25/2022</a:t>
             </a:fld>
             <a:endParaRPr lang="en-US"/>
           </a:p>
@@ -1960,7 +2028,7 @@
           </a:lstStyle>
           <a:p>
             <a:r>
-              <a:rPr lang="en-US" smtClean="0"/>
+              <a:rPr lang="en-US"/>
               <a:t>Click to edit Master title style</a:t>
             </a:r>
             <a:endParaRPr lang="en-US" dirty="0"/>
@@ -2017,7 +2085,7 @@
           <a:p>
             <a:pPr lvl="0"/>
             <a:r>
-              <a:rPr lang="en-US" smtClean="0"/>
+              <a:rPr lang="en-US"/>
               <a:t>Click to edit Master text styles</a:t>
             </a:r>
           </a:p>
@@ -2136,7 +2204,7 @@
           <a:p>
             <a:pPr lvl="0"/>
             <a:r>
-              <a:rPr lang="en-US" smtClean="0"/>
+              <a:rPr lang="en-US"/>
               <a:t>Click to edit Master text styles</a:t>
             </a:r>
           </a:p>
@@ -2159,7 +2227,7 @@
           <a:p>
             <a:fld id="{7089D775-5E9B-4629-9D96-EF51071362CD}" type="datetime1">
               <a:rPr lang="en-US" smtClean="0"/>
-              <a:t>4/23/2022</a:t>
+              <a:t>4/25/2022</a:t>
             </a:fld>
             <a:endParaRPr lang="en-US"/>
           </a:p>
@@ -2264,7 +2332,7 @@
           </a:lstStyle>
           <a:p>
             <a:r>
-              <a:rPr lang="en-US" smtClean="0"/>
+              <a:rPr lang="en-US"/>
               <a:t>Click to edit Master title style</a:t>
             </a:r>
             <a:endParaRPr lang="en-US" dirty="0"/>
@@ -2384,7 +2452,7 @@
           <a:p>
             <a:pPr lvl="0"/>
             <a:r>
-              <a:rPr lang="en-US" smtClean="0"/>
+              <a:rPr lang="en-US"/>
               <a:t>Click to edit Master text styles</a:t>
             </a:r>
           </a:p>
@@ -2407,7 +2475,7 @@
           <a:p>
             <a:fld id="{BD43C69F-02AB-495C-A550-ADA3A622B671}" type="datetime1">
               <a:rPr lang="en-US" smtClean="0"/>
-              <a:t>4/23/2022</a:t>
+              <a:t>4/25/2022</a:t>
             </a:fld>
             <a:endParaRPr lang="en-US"/>
           </a:p>
@@ -2748,7 +2816,7 @@
           </a:lstStyle>
           <a:p>
             <a:r>
-              <a:rPr lang="en-US" smtClean="0"/>
+              <a:rPr lang="en-US"/>
               <a:t>Click to edit Master title style</a:t>
             </a:r>
             <a:endParaRPr lang="en-US" dirty="0"/>
@@ -2797,7 +2865,7 @@
               <a:buNone/>
             </a:pPr>
             <a:r>
-              <a:rPr lang="en-US" smtClean="0"/>
+              <a:rPr lang="en-US"/>
               <a:t>Click to edit Master text styles</a:t>
             </a:r>
           </a:p>
@@ -2916,7 +2984,7 @@
           <a:p>
             <a:pPr lvl="0"/>
             <a:r>
-              <a:rPr lang="en-US" smtClean="0"/>
+              <a:rPr lang="en-US"/>
               <a:t>Click to edit Master text styles</a:t>
             </a:r>
           </a:p>
@@ -2939,7 +3007,7 @@
           <a:p>
             <a:fld id="{9085FE1B-0024-4062-BEC7-AA04B1A77233}" type="datetime1">
               <a:rPr lang="en-US" smtClean="0"/>
-              <a:t>4/23/2022</a:t>
+              <a:t>4/25/2022</a:t>
             </a:fld>
             <a:endParaRPr lang="en-US"/>
           </a:p>
@@ -3045,7 +3113,7 @@
           <a:p>
             <a:pPr marL="0" lvl="0"/>
             <a:r>
-              <a:rPr lang="en-US" smtClean="0"/>
+              <a:rPr lang="en-US"/>
               <a:t>Click to edit Master title style</a:t>
             </a:r>
             <a:endParaRPr lang="en-US" dirty="0"/>
@@ -3094,7 +3162,7 @@
               <a:buNone/>
             </a:pPr>
             <a:r>
-              <a:rPr lang="en-US" smtClean="0"/>
+              <a:rPr lang="en-US"/>
               <a:t>Click to edit Master text styles</a:t>
             </a:r>
           </a:p>
@@ -3213,7 +3281,7 @@
           <a:p>
             <a:pPr lvl="0"/>
             <a:r>
-              <a:rPr lang="en-US" smtClean="0"/>
+              <a:rPr lang="en-US"/>
               <a:t>Click to edit Master text styles</a:t>
             </a:r>
           </a:p>
@@ -3236,7 +3304,7 @@
           <a:p>
             <a:fld id="{E713B749-F4B4-4E13-B331-4987C017D17F}" type="datetime1">
               <a:rPr lang="en-US" smtClean="0"/>
-              <a:t>4/23/2022</a:t>
+              <a:t>4/25/2022</a:t>
             </a:fld>
             <a:endParaRPr lang="en-US"/>
           </a:p>
@@ -3334,7 +3402,7 @@
           </a:lstStyle>
           <a:p>
             <a:r>
-              <a:rPr lang="en-US" smtClean="0"/>
+              <a:rPr lang="en-US"/>
               <a:t>Click to edit Master title style</a:t>
             </a:r>
             <a:endParaRPr lang="en-US" dirty="0"/>
@@ -3358,35 +3426,35 @@
           <a:p>
             <a:pPr lvl="0"/>
             <a:r>
-              <a:rPr lang="en-US" smtClean="0"/>
+              <a:rPr lang="en-US"/>
               <a:t>Click to edit Master text styles</a:t>
             </a:r>
           </a:p>
           <a:p>
             <a:pPr lvl="1"/>
             <a:r>
-              <a:rPr lang="en-US" smtClean="0"/>
+              <a:rPr lang="en-US"/>
               <a:t>Second level</a:t>
             </a:r>
           </a:p>
           <a:p>
             <a:pPr lvl="2"/>
             <a:r>
-              <a:rPr lang="en-US" smtClean="0"/>
+              <a:rPr lang="en-US"/>
               <a:t>Third level</a:t>
             </a:r>
           </a:p>
           <a:p>
             <a:pPr lvl="3"/>
             <a:r>
-              <a:rPr lang="en-US" smtClean="0"/>
+              <a:rPr lang="en-US"/>
               <a:t>Fourth level</a:t>
             </a:r>
           </a:p>
           <a:p>
             <a:pPr lvl="4"/>
             <a:r>
-              <a:rPr lang="en-US" smtClean="0"/>
+              <a:rPr lang="en-US"/>
               <a:t>Fifth level</a:t>
             </a:r>
             <a:endParaRPr lang="en-US" dirty="0"/>
@@ -3410,7 +3478,7 @@
           <a:p>
             <a:fld id="{9DED7DAA-E179-402F-B9EA-F2814A1F0C05}" type="datetime1">
               <a:rPr lang="en-US" smtClean="0"/>
-              <a:t>4/23/2022</a:t>
+              <a:t>4/25/2022</a:t>
             </a:fld>
             <a:endParaRPr lang="en-US"/>
           </a:p>
@@ -3509,7 +3577,7 @@
           <a:lstStyle/>
           <a:p>
             <a:r>
-              <a:rPr lang="en-US" smtClean="0"/>
+              <a:rPr lang="en-US"/>
               <a:t>Click to edit Master title style</a:t>
             </a:r>
             <a:endParaRPr lang="en-US" dirty="0"/>
@@ -3538,35 +3606,35 @@
           <a:p>
             <a:pPr lvl="0"/>
             <a:r>
-              <a:rPr lang="en-US" smtClean="0"/>
+              <a:rPr lang="en-US"/>
               <a:t>Click to edit Master text styles</a:t>
             </a:r>
           </a:p>
           <a:p>
             <a:pPr lvl="1"/>
             <a:r>
-              <a:rPr lang="en-US" smtClean="0"/>
+              <a:rPr lang="en-US"/>
               <a:t>Second level</a:t>
             </a:r>
           </a:p>
           <a:p>
             <a:pPr lvl="2"/>
             <a:r>
-              <a:rPr lang="en-US" smtClean="0"/>
+              <a:rPr lang="en-US"/>
               <a:t>Third level</a:t>
             </a:r>
           </a:p>
           <a:p>
             <a:pPr lvl="3"/>
             <a:r>
-              <a:rPr lang="en-US" smtClean="0"/>
+              <a:rPr lang="en-US"/>
               <a:t>Fourth level</a:t>
             </a:r>
           </a:p>
           <a:p>
             <a:pPr lvl="4"/>
             <a:r>
-              <a:rPr lang="en-US" smtClean="0"/>
+              <a:rPr lang="en-US"/>
               <a:t>Fifth level</a:t>
             </a:r>
             <a:endParaRPr lang="en-US" dirty="0"/>
@@ -3590,7 +3658,7 @@
           <a:p>
             <a:fld id="{190E398C-8B50-498A-8BCD-C638365344AD}" type="datetime1">
               <a:rPr lang="en-US" smtClean="0"/>
-              <a:t>4/23/2022</a:t>
+              <a:t>4/25/2022</a:t>
             </a:fld>
             <a:endParaRPr lang="en-US"/>
           </a:p>
@@ -3684,7 +3752,7 @@
           <a:lstStyle/>
           <a:p>
             <a:r>
-              <a:rPr lang="en-US" smtClean="0"/>
+              <a:rPr lang="en-US"/>
               <a:t>Click to edit Master title style</a:t>
             </a:r>
             <a:endParaRPr lang="en-US" dirty="0"/>
@@ -3708,35 +3776,35 @@
           <a:p>
             <a:pPr lvl="0"/>
             <a:r>
-              <a:rPr lang="en-US" smtClean="0"/>
+              <a:rPr lang="en-US"/>
               <a:t>Click to edit Master text styles</a:t>
             </a:r>
           </a:p>
           <a:p>
             <a:pPr lvl="1"/>
             <a:r>
-              <a:rPr lang="en-US" smtClean="0"/>
+              <a:rPr lang="en-US"/>
               <a:t>Second level</a:t>
             </a:r>
           </a:p>
           <a:p>
             <a:pPr lvl="2"/>
             <a:r>
-              <a:rPr lang="en-US" smtClean="0"/>
+              <a:rPr lang="en-US"/>
               <a:t>Third level</a:t>
             </a:r>
           </a:p>
           <a:p>
             <a:pPr lvl="3"/>
             <a:r>
-              <a:rPr lang="en-US" smtClean="0"/>
+              <a:rPr lang="en-US"/>
               <a:t>Fourth level</a:t>
             </a:r>
           </a:p>
           <a:p>
             <a:pPr lvl="4"/>
             <a:r>
-              <a:rPr lang="en-US" smtClean="0"/>
+              <a:rPr lang="en-US"/>
               <a:t>Fifth level</a:t>
             </a:r>
             <a:endParaRPr lang="en-US" dirty="0"/>
@@ -3760,7 +3828,7 @@
           <a:p>
             <a:fld id="{6CAD799B-A048-4505-AE75-77008D357C86}" type="datetime1">
               <a:rPr lang="en-US" smtClean="0"/>
-              <a:t>4/23/2022</a:t>
+              <a:t>4/25/2022</a:t>
             </a:fld>
             <a:endParaRPr lang="en-US"/>
           </a:p>
@@ -3868,7 +3936,7 @@
           </a:lstStyle>
           <a:p>
             <a:r>
-              <a:rPr lang="en-US" smtClean="0"/>
+              <a:rPr lang="en-US"/>
               <a:t>Click to edit Master title style</a:t>
             </a:r>
             <a:endParaRPr lang="en-US" dirty="0"/>
@@ -3988,7 +4056,7 @@
           <a:p>
             <a:pPr lvl="0"/>
             <a:r>
-              <a:rPr lang="en-US" smtClean="0"/>
+              <a:rPr lang="en-US"/>
               <a:t>Click to edit Master text styles</a:t>
             </a:r>
           </a:p>
@@ -4011,7 +4079,7 @@
           <a:p>
             <a:fld id="{AD45542A-0B6B-4EB5-93E4-2AA0E3781316}" type="datetime1">
               <a:rPr lang="en-US" smtClean="0"/>
-              <a:t>4/23/2022</a:t>
+              <a:t>4/25/2022</a:t>
             </a:fld>
             <a:endParaRPr lang="en-US"/>
           </a:p>
@@ -4110,7 +4178,7 @@
           <a:lstStyle/>
           <a:p>
             <a:r>
-              <a:rPr lang="en-US" smtClean="0"/>
+              <a:rPr lang="en-US"/>
               <a:t>Click to edit Master title style</a:t>
             </a:r>
             <a:endParaRPr lang="en-US" dirty="0"/>
@@ -4169,35 +4237,35 @@
           <a:p>
             <a:pPr lvl="0"/>
             <a:r>
-              <a:rPr lang="en-US" smtClean="0"/>
+              <a:rPr lang="en-US"/>
               <a:t>Click to edit Master text styles</a:t>
             </a:r>
           </a:p>
           <a:p>
             <a:pPr lvl="1"/>
             <a:r>
-              <a:rPr lang="en-US" smtClean="0"/>
+              <a:rPr lang="en-US"/>
               <a:t>Second level</a:t>
             </a:r>
           </a:p>
           <a:p>
             <a:pPr lvl="2"/>
             <a:r>
-              <a:rPr lang="en-US" smtClean="0"/>
+              <a:rPr lang="en-US"/>
               <a:t>Third level</a:t>
             </a:r>
           </a:p>
           <a:p>
             <a:pPr lvl="3"/>
             <a:r>
-              <a:rPr lang="en-US" smtClean="0"/>
+              <a:rPr lang="en-US"/>
               <a:t>Fourth level</a:t>
             </a:r>
           </a:p>
           <a:p>
             <a:pPr lvl="4"/>
             <a:r>
-              <a:rPr lang="en-US" smtClean="0"/>
+              <a:rPr lang="en-US"/>
               <a:t>Fifth level</a:t>
             </a:r>
             <a:endParaRPr lang="en-US" dirty="0"/>
@@ -4256,35 +4324,35 @@
           <a:p>
             <a:pPr lvl="0"/>
             <a:r>
-              <a:rPr lang="en-US" smtClean="0"/>
+              <a:rPr lang="en-US"/>
               <a:t>Click to edit Master text styles</a:t>
             </a:r>
           </a:p>
           <a:p>
             <a:pPr lvl="1"/>
             <a:r>
-              <a:rPr lang="en-US" smtClean="0"/>
+              <a:rPr lang="en-US"/>
               <a:t>Second level</a:t>
             </a:r>
           </a:p>
           <a:p>
             <a:pPr lvl="2"/>
             <a:r>
-              <a:rPr lang="en-US" smtClean="0"/>
+              <a:rPr lang="en-US"/>
               <a:t>Third level</a:t>
             </a:r>
           </a:p>
           <a:p>
             <a:pPr lvl="3"/>
             <a:r>
-              <a:rPr lang="en-US" smtClean="0"/>
+              <a:rPr lang="en-US"/>
               <a:t>Fourth level</a:t>
             </a:r>
           </a:p>
           <a:p>
             <a:pPr lvl="4"/>
             <a:r>
-              <a:rPr lang="en-US" smtClean="0"/>
+              <a:rPr lang="en-US"/>
               <a:t>Fifth level</a:t>
             </a:r>
             <a:endParaRPr lang="en-US" dirty="0"/>
@@ -4308,7 +4376,7 @@
           <a:p>
             <a:fld id="{F6A2A841-8FAB-43A3-9102-46C6D950EA4B}" type="datetime1">
               <a:rPr lang="en-US" smtClean="0"/>
-              <a:t>4/23/2022</a:t>
+              <a:t>4/25/2022</a:t>
             </a:fld>
             <a:endParaRPr lang="en-US"/>
           </a:p>
@@ -4406,7 +4474,7 @@
           </a:lstStyle>
           <a:p>
             <a:r>
-              <a:rPr lang="en-US" smtClean="0"/>
+              <a:rPr lang="en-US"/>
               <a:t>Click to edit Master title style</a:t>
             </a:r>
             <a:endParaRPr lang="en-US" dirty="0"/>
@@ -4480,7 +4548,7 @@
           <a:p>
             <a:pPr lvl="0"/>
             <a:r>
-              <a:rPr lang="en-US" smtClean="0"/>
+              <a:rPr lang="en-US"/>
               <a:t>Click to edit Master text styles</a:t>
             </a:r>
           </a:p>
@@ -4538,35 +4606,35 @@
           <a:p>
             <a:pPr lvl="0"/>
             <a:r>
-              <a:rPr lang="en-US" smtClean="0"/>
+              <a:rPr lang="en-US"/>
               <a:t>Click to edit Master text styles</a:t>
             </a:r>
           </a:p>
           <a:p>
             <a:pPr lvl="1"/>
             <a:r>
-              <a:rPr lang="en-US" smtClean="0"/>
+              <a:rPr lang="en-US"/>
               <a:t>Second level</a:t>
             </a:r>
           </a:p>
           <a:p>
             <a:pPr lvl="2"/>
             <a:r>
-              <a:rPr lang="en-US" smtClean="0"/>
+              <a:rPr lang="en-US"/>
               <a:t>Third level</a:t>
             </a:r>
           </a:p>
           <a:p>
             <a:pPr lvl="3"/>
             <a:r>
-              <a:rPr lang="en-US" smtClean="0"/>
+              <a:rPr lang="en-US"/>
               <a:t>Fourth level</a:t>
             </a:r>
           </a:p>
           <a:p>
             <a:pPr lvl="4"/>
             <a:r>
-              <a:rPr lang="en-US" smtClean="0"/>
+              <a:rPr lang="en-US"/>
               <a:t>Fifth level</a:t>
             </a:r>
             <a:endParaRPr lang="en-US" dirty="0"/>
@@ -4640,7 +4708,7 @@
           <a:p>
             <a:pPr lvl="0"/>
             <a:r>
-              <a:rPr lang="en-US" smtClean="0"/>
+              <a:rPr lang="en-US"/>
               <a:t>Click to edit Master text styles</a:t>
             </a:r>
           </a:p>
@@ -4698,35 +4766,35 @@
           <a:p>
             <a:pPr lvl="0"/>
             <a:r>
-              <a:rPr lang="en-US" smtClean="0"/>
+              <a:rPr lang="en-US"/>
               <a:t>Click to edit Master text styles</a:t>
             </a:r>
           </a:p>
           <a:p>
             <a:pPr lvl="1"/>
             <a:r>
-              <a:rPr lang="en-US" smtClean="0"/>
+              <a:rPr lang="en-US"/>
               <a:t>Second level</a:t>
             </a:r>
           </a:p>
           <a:p>
             <a:pPr lvl="2"/>
             <a:r>
-              <a:rPr lang="en-US" smtClean="0"/>
+              <a:rPr lang="en-US"/>
               <a:t>Third level</a:t>
             </a:r>
           </a:p>
           <a:p>
             <a:pPr lvl="3"/>
             <a:r>
-              <a:rPr lang="en-US" smtClean="0"/>
+              <a:rPr lang="en-US"/>
               <a:t>Fourth level</a:t>
             </a:r>
           </a:p>
           <a:p>
             <a:pPr lvl="4"/>
             <a:r>
-              <a:rPr lang="en-US" smtClean="0"/>
+              <a:rPr lang="en-US"/>
               <a:t>Fifth level</a:t>
             </a:r>
             <a:endParaRPr lang="en-US" dirty="0"/>
@@ -4750,7 +4818,7 @@
           <a:p>
             <a:fld id="{68BA6A83-CFAF-4164-9050-5BB6942A0D8D}" type="datetime1">
               <a:rPr lang="en-US" smtClean="0"/>
-              <a:t>4/23/2022</a:t>
+              <a:t>4/25/2022</a:t>
             </a:fld>
             <a:endParaRPr lang="en-US"/>
           </a:p>
@@ -4844,7 +4912,7 @@
           <a:lstStyle/>
           <a:p>
             <a:r>
-              <a:rPr lang="en-US" smtClean="0"/>
+              <a:rPr lang="en-US"/>
               <a:t>Click to edit Master title style</a:t>
             </a:r>
             <a:endParaRPr lang="en-US" dirty="0"/>
@@ -4868,7 +4936,7 @@
           <a:p>
             <a:fld id="{9BE354EA-D510-4423-89F2-24F4C1BC5BB4}" type="datetime1">
               <a:rPr lang="en-US" smtClean="0"/>
-              <a:t>4/23/2022</a:t>
+              <a:t>4/25/2022</a:t>
             </a:fld>
             <a:endParaRPr lang="en-US"/>
           </a:p>
@@ -4963,7 +5031,7 @@
           <a:p>
             <a:fld id="{B063806C-A650-44E9-9C81-FB6A19EA0B97}" type="datetime1">
               <a:rPr lang="en-US" smtClean="0"/>
-              <a:t>4/23/2022</a:t>
+              <a:t>4/25/2022</a:t>
             </a:fld>
             <a:endParaRPr lang="en-US"/>
           </a:p>
@@ -5068,7 +5136,7 @@
           </a:lstStyle>
           <a:p>
             <a:r>
-              <a:rPr lang="en-US" smtClean="0"/>
+              <a:rPr lang="en-US"/>
               <a:t>Click to edit Master title style</a:t>
             </a:r>
             <a:endParaRPr lang="en-US" dirty="0"/>
@@ -5127,35 +5195,35 @@
           <a:p>
             <a:pPr lvl="0"/>
             <a:r>
-              <a:rPr lang="en-US" smtClean="0"/>
+              <a:rPr lang="en-US"/>
               <a:t>Click to edit Master text styles</a:t>
             </a:r>
           </a:p>
           <a:p>
             <a:pPr lvl="1"/>
             <a:r>
-              <a:rPr lang="en-US" smtClean="0"/>
+              <a:rPr lang="en-US"/>
               <a:t>Second level</a:t>
             </a:r>
           </a:p>
           <a:p>
             <a:pPr lvl="2"/>
             <a:r>
-              <a:rPr lang="en-US" smtClean="0"/>
+              <a:rPr lang="en-US"/>
               <a:t>Third level</a:t>
             </a:r>
           </a:p>
           <a:p>
             <a:pPr lvl="3"/>
             <a:r>
-              <a:rPr lang="en-US" smtClean="0"/>
+              <a:rPr lang="en-US"/>
               <a:t>Fourth level</a:t>
             </a:r>
           </a:p>
           <a:p>
             <a:pPr lvl="4"/>
             <a:r>
-              <a:rPr lang="en-US" smtClean="0"/>
+              <a:rPr lang="en-US"/>
               <a:t>Fifth level</a:t>
             </a:r>
             <a:endParaRPr lang="en-US" dirty="0"/>
@@ -5223,7 +5291,7 @@
           <a:p>
             <a:pPr lvl="0"/>
             <a:r>
-              <a:rPr lang="en-US" smtClean="0"/>
+              <a:rPr lang="en-US"/>
               <a:t>Click to edit Master text styles</a:t>
             </a:r>
           </a:p>
@@ -5246,7 +5314,7 @@
           <a:p>
             <a:fld id="{42028E69-8078-4787-B21E-2DF2BA837AA8}" type="datetime1">
               <a:rPr lang="en-US" smtClean="0"/>
-              <a:t>4/23/2022</a:t>
+              <a:t>4/25/2022</a:t>
             </a:fld>
             <a:endParaRPr lang="en-US"/>
           </a:p>
@@ -5351,7 +5419,7 @@
           </a:lstStyle>
           <a:p>
             <a:r>
-              <a:rPr lang="en-US" smtClean="0"/>
+              <a:rPr lang="en-US"/>
               <a:t>Click to edit Master title style</a:t>
             </a:r>
             <a:endParaRPr lang="en-US" dirty="0"/>
@@ -5446,7 +5514,7 @@
           </a:lstStyle>
           <a:p>
             <a:r>
-              <a:rPr lang="en-US" smtClean="0"/>
+              <a:rPr lang="en-US"/>
               <a:t>Click icon to add picture</a:t>
             </a:r>
             <a:endParaRPr lang="en-US" dirty="0"/>
@@ -5514,7 +5582,7 @@
           <a:p>
             <a:pPr lvl="0"/>
             <a:r>
-              <a:rPr lang="en-US" smtClean="0"/>
+              <a:rPr lang="en-US"/>
               <a:t>Click to edit Master text styles</a:t>
             </a:r>
           </a:p>
@@ -5537,7 +5605,7 @@
           <a:p>
             <a:fld id="{05849163-CBAE-490C-AEBD-534B94453176}" type="datetime1">
               <a:rPr lang="en-US" smtClean="0"/>
-              <a:t>4/23/2022</a:t>
+              <a:t>4/25/2022</a:t>
             </a:fld>
             <a:endParaRPr lang="en-US"/>
           </a:p>
@@ -5963,7 +6031,7 @@
           <a:lstStyle/>
           <a:p>
             <a:r>
-              <a:rPr lang="en-US" smtClean="0"/>
+              <a:rPr lang="en-US"/>
               <a:t>Click to edit Master title style</a:t>
             </a:r>
             <a:endParaRPr lang="en-US" dirty="0"/>
@@ -5997,35 +6065,35 @@
           <a:p>
             <a:pPr lvl="0"/>
             <a:r>
-              <a:rPr lang="en-US" smtClean="0"/>
+              <a:rPr lang="en-US"/>
               <a:t>Click to edit Master text styles</a:t>
             </a:r>
           </a:p>
           <a:p>
             <a:pPr lvl="1"/>
             <a:r>
-              <a:rPr lang="en-US" smtClean="0"/>
+              <a:rPr lang="en-US"/>
               <a:t>Second level</a:t>
             </a:r>
           </a:p>
           <a:p>
             <a:pPr lvl="2"/>
             <a:r>
-              <a:rPr lang="en-US" smtClean="0"/>
+              <a:rPr lang="en-US"/>
               <a:t>Third level</a:t>
             </a:r>
           </a:p>
           <a:p>
             <a:pPr lvl="3"/>
             <a:r>
-              <a:rPr lang="en-US" smtClean="0"/>
+              <a:rPr lang="en-US"/>
               <a:t>Fourth level</a:t>
             </a:r>
           </a:p>
           <a:p>
             <a:pPr lvl="4"/>
             <a:r>
-              <a:rPr lang="en-US" smtClean="0"/>
+              <a:rPr lang="en-US"/>
               <a:t>Fifth level</a:t>
             </a:r>
             <a:endParaRPr lang="en-US" dirty="0"/>
@@ -6067,7 +6135,7 @@
           <a:p>
             <a:fld id="{F8588326-732E-4529-A246-6629552950EB}" type="datetime1">
               <a:rPr lang="en-US" smtClean="0"/>
-              <a:t>4/23/2022</a:t>
+              <a:t>4/25/2022</a:t>
             </a:fld>
             <a:endParaRPr lang="en-US"/>
           </a:p>
@@ -6622,16 +6690,12 @@
           <a:lstStyle/>
           <a:p>
             <a:r>
-              <a:rPr lang="en-US" sz="3200" dirty="0" smtClean="0">
+              <a:rPr lang="en-US" sz="3200" dirty="0">
                 <a:latin typeface="Times New Roman" panose="02020603050405020304" pitchFamily="18" charset="0"/>
                 <a:cs typeface="Times New Roman" panose="02020603050405020304" pitchFamily="18" charset="0"/>
               </a:rPr>
               <a:t>DSE 6300- DATA SCIENCE APPLICATIONS  DEVELOPMENT</a:t>
             </a:r>
-            <a:endParaRPr lang="en-US" sz="3200" dirty="0">
-              <a:latin typeface="Times New Roman" panose="02020603050405020304" pitchFamily="18" charset="0"/>
-              <a:cs typeface="Times New Roman" panose="02020603050405020304" pitchFamily="18" charset="0"/>
-            </a:endParaRPr>
           </a:p>
         </p:txBody>
       </p:sp>
@@ -6658,7 +6722,7 @@
           <a:lstStyle/>
           <a:p>
             <a:r>
-              <a:rPr lang="en-US" sz="2200" b="1" dirty="0" smtClean="0">
+              <a:rPr lang="en-US" sz="2200" b="1" dirty="0">
                 <a:latin typeface="Times New Roman" panose="02020603050405020304" pitchFamily="18" charset="0"/>
                 <a:cs typeface="Times New Roman" panose="02020603050405020304" pitchFamily="18" charset="0"/>
               </a:rPr>
@@ -6666,34 +6730,34 @@
             </a:r>
           </a:p>
           <a:p>
-            <a:endParaRPr lang="en-US" sz="2800" dirty="0" smtClean="0">
+            <a:endParaRPr lang="en-US" sz="2800" dirty="0">
               <a:latin typeface="Times New Roman" panose="02020603050405020304" pitchFamily="18" charset="0"/>
               <a:cs typeface="Times New Roman" panose="02020603050405020304" pitchFamily="18" charset="0"/>
             </a:endParaRPr>
           </a:p>
           <a:p>
             <a:r>
-              <a:rPr lang="en-US" sz="2800" dirty="0" smtClean="0">
+              <a:rPr lang="en-US" sz="2800" dirty="0">
                 <a:latin typeface="Times New Roman" panose="02020603050405020304" pitchFamily="18" charset="0"/>
                 <a:cs typeface="Times New Roman" panose="02020603050405020304" pitchFamily="18" charset="0"/>
               </a:rPr>
               <a:t>Karolina </a:t>
             </a:r>
             <a:r>
-              <a:rPr lang="en-US" sz="2800" dirty="0" err="1" smtClean="0">
+              <a:rPr lang="en-US" sz="2800" dirty="0" err="1">
                 <a:latin typeface="Times New Roman" panose="02020603050405020304" pitchFamily="18" charset="0"/>
                 <a:cs typeface="Times New Roman" panose="02020603050405020304" pitchFamily="18" charset="0"/>
               </a:rPr>
               <a:t>Konopka</a:t>
             </a:r>
-            <a:endParaRPr lang="en-US" sz="2800" dirty="0" smtClean="0">
+            <a:endParaRPr lang="en-US" sz="2800" dirty="0">
               <a:latin typeface="Times New Roman" panose="02020603050405020304" pitchFamily="18" charset="0"/>
               <a:cs typeface="Times New Roman" panose="02020603050405020304" pitchFamily="18" charset="0"/>
             </a:endParaRPr>
           </a:p>
           <a:p>
             <a:r>
-              <a:rPr lang="en-US" sz="2800" dirty="0" smtClean="0">
+              <a:rPr lang="en-US" sz="2800" dirty="0">
                 <a:latin typeface="Times New Roman" panose="02020603050405020304" pitchFamily="18" charset="0"/>
                 <a:cs typeface="Times New Roman" panose="02020603050405020304" pitchFamily="18" charset="0"/>
               </a:rPr>
@@ -6702,33 +6766,15 @@
           </a:p>
           <a:p>
             <a:r>
-              <a:rPr lang="en-US" sz="2800" dirty="0" err="1" smtClean="0">
+              <a:rPr lang="en-US" sz="2800" dirty="0">
                 <a:latin typeface="Times New Roman" panose="02020603050405020304" pitchFamily="18" charset="0"/>
                 <a:cs typeface="Times New Roman" panose="02020603050405020304" pitchFamily="18" charset="0"/>
               </a:rPr>
-              <a:t>Priyadharshini</a:t>
-            </a:r>
-            <a:r>
-              <a:rPr lang="en-US" sz="2800" dirty="0" smtClean="0">
-                <a:latin typeface="Times New Roman" panose="02020603050405020304" pitchFamily="18" charset="0"/>
-                <a:cs typeface="Times New Roman" panose="02020603050405020304" pitchFamily="18" charset="0"/>
-              </a:rPr>
-              <a:t> </a:t>
-            </a:r>
-            <a:r>
-              <a:rPr lang="en-US" sz="2800" dirty="0" err="1" smtClean="0">
-                <a:latin typeface="Times New Roman" panose="02020603050405020304" pitchFamily="18" charset="0"/>
-                <a:cs typeface="Times New Roman" panose="02020603050405020304" pitchFamily="18" charset="0"/>
-              </a:rPr>
-              <a:t>Pitchai</a:t>
-            </a:r>
-            <a:endParaRPr lang="en-US" sz="2800" dirty="0" smtClean="0">
-              <a:latin typeface="Times New Roman" panose="02020603050405020304" pitchFamily="18" charset="0"/>
-              <a:cs typeface="Times New Roman" panose="02020603050405020304" pitchFamily="18" charset="0"/>
-            </a:endParaRPr>
-          </a:p>
-          <a:p>
-            <a:endParaRPr lang="en-US" dirty="0" smtClean="0"/>
+              <a:t>Priyadharshini Pichai</a:t>
+            </a:r>
+          </a:p>
+          <a:p>
+            <a:endParaRPr lang="en-US" dirty="0"/>
           </a:p>
         </p:txBody>
       </p:sp>
@@ -6756,7 +6802,7 @@
           <a:p>
             <a:fld id="{2DDF7597-F3C7-417E-9589-A198EC223F9B}" type="datetime2">
               <a:rPr lang="en-US"/>
-              <a:t>Saturday, April 23, 2022</a:t>
+              <a:t>Monday, April 25, 2022</a:t>
             </a:fld>
             <a:endParaRPr lang="en-US" dirty="0"/>
           </a:p>
@@ -6795,13 +6841,6 @@
   <p:clrMapOvr>
     <a:masterClrMapping/>
   </p:clrMapOvr>
-  <p:timing>
-    <p:tnLst>
-      <p:par>
-        <p:cTn id="1" dur="indefinite" restart="never" nodeType="tmRoot"/>
-      </p:par>
-    </p:tnLst>
-  </p:timing>
 </p:sld>
 </file>
 
@@ -6839,53 +6878,28 @@
           </a:bodyPr>
           <a:lstStyle/>
           <a:p>
-            <a:r>
-              <a:rPr lang="en-US" dirty="0" smtClean="0"/>
-              <a:t/>
-            </a:r>
-            <a:br>
-              <a:rPr lang="en-US" dirty="0" smtClean="0"/>
-            </a:br>
-            <a:r>
-              <a:rPr lang="en-US" dirty="0"/>
-              <a:t/>
-            </a:r>
             <a:br>
               <a:rPr lang="en-US" dirty="0"/>
             </a:br>
-            <a:r>
-              <a:rPr lang="en-US" dirty="0" smtClean="0"/>
-              <a:t/>
-            </a:r>
-            <a:br>
-              <a:rPr lang="en-US" dirty="0" smtClean="0"/>
-            </a:br>
-            <a:r>
-              <a:rPr lang="en-US" dirty="0"/>
-              <a:t/>
-            </a:r>
             <a:br>
               <a:rPr lang="en-US" dirty="0"/>
             </a:br>
-            <a:r>
-              <a:rPr lang="en-US" dirty="0" smtClean="0"/>
-              <a:t/>
-            </a:r>
-            <a:br>
-              <a:rPr lang="en-US" dirty="0" smtClean="0"/>
-            </a:br>
-            <a:r>
-              <a:rPr lang="en-US" dirty="0"/>
-              <a:t/>
-            </a:r>
             <a:br>
               <a:rPr lang="en-US" dirty="0"/>
             </a:br>
-            <a:r>
-              <a:rPr lang="en-US" sz="8000" dirty="0" smtClean="0"/>
+            <a:br>
+              <a:rPr lang="en-US" dirty="0"/>
+            </a:br>
+            <a:br>
+              <a:rPr lang="en-US" dirty="0"/>
+            </a:br>
+            <a:br>
+              <a:rPr lang="en-US" dirty="0"/>
+            </a:br>
+            <a:r>
+              <a:rPr lang="en-US" sz="8000" dirty="0"/>
               <a:t>LIVE DEMO</a:t>
             </a:r>
-            <a:endParaRPr lang="en-US" sz="8000" dirty="0"/>
           </a:p>
         </p:txBody>
       </p:sp>
@@ -6965,16 +6979,12 @@
           <a:lstStyle/>
           <a:p>
             <a:r>
-              <a:rPr lang="en-US" sz="4000" dirty="0" smtClean="0">
+              <a:rPr lang="en-US" sz="4000" dirty="0">
                 <a:latin typeface="Times New Roman" panose="02020603050405020304" pitchFamily="18" charset="0"/>
                 <a:cs typeface="Times New Roman" panose="02020603050405020304" pitchFamily="18" charset="0"/>
               </a:rPr>
               <a:t>Trello</a:t>
             </a:r>
-            <a:endParaRPr lang="en-US" sz="4000" dirty="0">
-              <a:latin typeface="Times New Roman" panose="02020603050405020304" pitchFamily="18" charset="0"/>
-              <a:cs typeface="Times New Roman" panose="02020603050405020304" pitchFamily="18" charset="0"/>
-            </a:endParaRPr>
           </a:p>
         </p:txBody>
       </p:sp>
@@ -7040,13 +7050,6 @@
   <p:clrMapOvr>
     <a:masterClrMapping/>
   </p:clrMapOvr>
-  <p:timing>
-    <p:tnLst>
-      <p:par>
-        <p:cTn id="1" dur="indefinite" restart="never" nodeType="tmRoot"/>
-      </p:par>
-    </p:tnLst>
-  </p:timing>
 </p:sld>
 </file>
 
@@ -7090,23 +7093,19 @@
           <a:lstStyle/>
           <a:p>
             <a:r>
-              <a:rPr lang="en-US" sz="4000" dirty="0" err="1" smtClean="0">
+              <a:rPr lang="en-US" sz="4000" dirty="0" err="1">
                 <a:latin typeface="Times New Roman" panose="02020603050405020304" pitchFamily="18" charset="0"/>
                 <a:cs typeface="Times New Roman" panose="02020603050405020304" pitchFamily="18" charset="0"/>
               </a:rPr>
               <a:t>Git</a:t>
             </a:r>
             <a:r>
-              <a:rPr lang="en-US" sz="4000" dirty="0" smtClean="0">
+              <a:rPr lang="en-US" sz="4000" dirty="0">
                 <a:latin typeface="Times New Roman" panose="02020603050405020304" pitchFamily="18" charset="0"/>
                 <a:cs typeface="Times New Roman" panose="02020603050405020304" pitchFamily="18" charset="0"/>
               </a:rPr>
               <a:t> Hub</a:t>
             </a:r>
-            <a:endParaRPr lang="en-US" sz="4000" dirty="0">
-              <a:latin typeface="Times New Roman" panose="02020603050405020304" pitchFamily="18" charset="0"/>
-              <a:cs typeface="Times New Roman" panose="02020603050405020304" pitchFamily="18" charset="0"/>
-            </a:endParaRPr>
           </a:p>
         </p:txBody>
       </p:sp>
@@ -7227,13 +7226,6 @@
   <p:clrMapOvr>
     <a:masterClrMapping/>
   </p:clrMapOvr>
-  <p:timing>
-    <p:tnLst>
-      <p:par>
-        <p:cTn id="1" dur="indefinite" restart="never" nodeType="tmRoot"/>
-      </p:par>
-    </p:tnLst>
-  </p:timing>
 </p:sld>
 </file>
 
@@ -7277,16 +7269,12 @@
           <a:lstStyle/>
           <a:p>
             <a:r>
-              <a:rPr lang="en-US" sz="4800" dirty="0" smtClean="0">
+              <a:rPr lang="en-US" sz="4800" dirty="0">
                 <a:latin typeface="Times New Roman" panose="02020603050405020304" pitchFamily="18" charset="0"/>
                 <a:cs typeface="Times New Roman" panose="02020603050405020304" pitchFamily="18" charset="0"/>
               </a:rPr>
               <a:t>Challenges</a:t>
             </a:r>
-            <a:endParaRPr lang="en-US" sz="4800" dirty="0">
-              <a:latin typeface="Times New Roman" panose="02020603050405020304" pitchFamily="18" charset="0"/>
-              <a:cs typeface="Times New Roman" panose="02020603050405020304" pitchFamily="18" charset="0"/>
-            </a:endParaRPr>
           </a:p>
         </p:txBody>
       </p:sp>
@@ -7336,16 +7324,12 @@
           <a:lstStyle/>
           <a:p>
             <a:r>
-              <a:rPr lang="en-US" sz="4800" dirty="0" smtClean="0">
+              <a:rPr lang="en-US" sz="4800" dirty="0">
                 <a:latin typeface="Times New Roman" panose="02020603050405020304" pitchFamily="18" charset="0"/>
                 <a:cs typeface="Times New Roman" panose="02020603050405020304" pitchFamily="18" charset="0"/>
               </a:rPr>
               <a:t>Compatibility issues</a:t>
             </a:r>
-            <a:endParaRPr lang="en-US" sz="4800" dirty="0">
-              <a:latin typeface="Times New Roman" panose="02020603050405020304" pitchFamily="18" charset="0"/>
-              <a:cs typeface="Times New Roman" panose="02020603050405020304" pitchFamily="18" charset="0"/>
-            </a:endParaRPr>
           </a:p>
         </p:txBody>
       </p:sp>
@@ -7359,17 +7343,150 @@
   <p:clrMapOvr>
     <a:masterClrMapping/>
   </p:clrMapOvr>
-  <p:timing>
-    <p:tnLst>
-      <p:par>
-        <p:cTn id="1" dur="indefinite" restart="never" nodeType="tmRoot"/>
-      </p:par>
-    </p:tnLst>
-  </p:timing>
 </p:sld>
 </file>
 
 <file path=ppt/slides/slide14.xml><?xml version="1.0" encoding="utf-8"?>
+<p:sld xmlns:a="http://schemas.openxmlformats.org/drawingml/2006/main" xmlns:r="http://schemas.openxmlformats.org/officeDocument/2006/relationships" xmlns:p="http://schemas.openxmlformats.org/presentationml/2006/main">
+  <p:cSld>
+    <p:spTree>
+      <p:nvGrpSpPr>
+        <p:cNvPr id="1" name=""/>
+        <p:cNvGrpSpPr/>
+        <p:nvPr/>
+      </p:nvGrpSpPr>
+      <p:grpSpPr>
+        <a:xfrm>
+          <a:off x="0" y="0"/>
+          <a:ext cx="0" cy="0"/>
+          <a:chOff x="0" y="0"/>
+          <a:chExt cx="0" cy="0"/>
+        </a:xfrm>
+      </p:grpSpPr>
+      <p:sp>
+        <p:nvSpPr>
+          <p:cNvPr id="2" name="Title 1"/>
+          <p:cNvSpPr>
+            <a:spLocks noGrp="1"/>
+          </p:cNvSpPr>
+          <p:nvPr>
+            <p:ph type="title"/>
+          </p:nvPr>
+        </p:nvSpPr>
+        <p:spPr>
+          <a:xfrm>
+            <a:off x="1484311" y="685801"/>
+            <a:ext cx="10018713" cy="1339948"/>
+          </a:xfrm>
+        </p:spPr>
+        <p:txBody>
+          <a:bodyPr>
+            <a:normAutofit/>
+          </a:bodyPr>
+          <a:lstStyle/>
+          <a:p>
+            <a:r>
+              <a:rPr lang="en-US" sz="4800" dirty="0">
+                <a:latin typeface="Times New Roman" panose="02020603050405020304" pitchFamily="18" charset="0"/>
+                <a:cs typeface="Times New Roman" panose="02020603050405020304" pitchFamily="18" charset="0"/>
+              </a:rPr>
+              <a:t>Future Goals</a:t>
+            </a:r>
+          </a:p>
+        </p:txBody>
+      </p:sp>
+      <p:sp>
+        <p:nvSpPr>
+          <p:cNvPr id="6" name="Slide Number Placeholder 5"/>
+          <p:cNvSpPr>
+            <a:spLocks noGrp="1"/>
+          </p:cNvSpPr>
+          <p:nvPr>
+            <p:ph type="sldNum" sz="quarter" idx="12"/>
+          </p:nvPr>
+        </p:nvSpPr>
+        <p:spPr/>
+        <p:txBody>
+          <a:bodyPr/>
+          <a:lstStyle/>
+          <a:p>
+            <a:fld id="{126287E9-9858-4616-BEA9-2CF9CC01AF62}" type="slidenum">
+              <a:rPr lang="en-US" smtClean="0"/>
+              <a:t>14</a:t>
+            </a:fld>
+            <a:endParaRPr lang="en-US"/>
+          </a:p>
+        </p:txBody>
+      </p:sp>
+      <p:sp>
+        <p:nvSpPr>
+          <p:cNvPr id="3" name="TextBox 2">
+            <a:extLst>
+              <a:ext uri="{FF2B5EF4-FFF2-40B4-BE49-F238E27FC236}">
+                <a16:creationId xmlns:a16="http://schemas.microsoft.com/office/drawing/2014/main" id="{E8E56DEB-1EDF-4218-92F3-85CA8ADE9895}"/>
+              </a:ext>
+            </a:extLst>
+          </p:cNvPr>
+          <p:cNvSpPr txBox="1"/>
+          <p:nvPr/>
+        </p:nvSpPr>
+        <p:spPr>
+          <a:xfrm>
+            <a:off x="2840182" y="2025749"/>
+            <a:ext cx="5915891" cy="954107"/>
+          </a:xfrm>
+          <a:prstGeom prst="rect">
+            <a:avLst/>
+          </a:prstGeom>
+          <a:noFill/>
+        </p:spPr>
+        <p:txBody>
+          <a:bodyPr wrap="square" rtlCol="0">
+            <a:spAutoFit/>
+          </a:bodyPr>
+          <a:lstStyle/>
+          <a:p>
+            <a:pPr marL="285750" indent="-285750">
+              <a:buFont typeface="Arial" panose="020B0604020202020204" pitchFamily="34" charset="0"/>
+              <a:buChar char="•"/>
+            </a:pPr>
+            <a:r>
+              <a:rPr lang="en-US" sz="2800" dirty="0">
+                <a:latin typeface="Times New Roman" panose="02020603050405020304" pitchFamily="18" charset="0"/>
+                <a:cs typeface="Times New Roman" panose="02020603050405020304" pitchFamily="18" charset="0"/>
+              </a:rPr>
+              <a:t>Live database use</a:t>
+            </a:r>
+          </a:p>
+          <a:p>
+            <a:pPr marL="285750" indent="-285750">
+              <a:buFont typeface="Arial" panose="020B0604020202020204" pitchFamily="34" charset="0"/>
+              <a:buChar char="•"/>
+            </a:pPr>
+            <a:r>
+              <a:rPr lang="en-US" sz="2800" dirty="0">
+                <a:latin typeface="Times New Roman" panose="02020603050405020304" pitchFamily="18" charset="0"/>
+                <a:cs typeface="Times New Roman" panose="02020603050405020304" pitchFamily="18" charset="0"/>
+              </a:rPr>
+              <a:t>User interactive application</a:t>
+            </a:r>
+          </a:p>
+        </p:txBody>
+      </p:sp>
+    </p:spTree>
+    <p:extLst>
+      <p:ext uri="{BB962C8B-B14F-4D97-AF65-F5344CB8AC3E}">
+        <p14:creationId xmlns:p14="http://schemas.microsoft.com/office/powerpoint/2010/main" val="2856388626"/>
+      </p:ext>
+    </p:extLst>
+  </p:cSld>
+  <p:clrMapOvr>
+    <a:masterClrMapping/>
+  </p:clrMapOvr>
+</p:sld>
+</file>
+
+<file path=ppt/slides/slide15.xml><?xml version="1.0" encoding="utf-8"?>
 <p:sld xmlns:a="http://schemas.openxmlformats.org/drawingml/2006/main" xmlns:r="http://schemas.openxmlformats.org/officeDocument/2006/relationships" xmlns:p="http://schemas.openxmlformats.org/presentationml/2006/main">
   <p:cSld>
     <p:spTree>
@@ -7433,7 +7550,7 @@
           <a:p>
             <a:fld id="{126287E9-9858-4616-BEA9-2CF9CC01AF62}" type="slidenum">
               <a:rPr lang="en-US" smtClean="0"/>
-              <a:t>14</a:t>
+              <a:t>15</a:t>
             </a:fld>
             <a:endParaRPr lang="en-US"/>
           </a:p>
@@ -7449,13 +7566,6 @@
   <p:clrMapOvr>
     <a:masterClrMapping/>
   </p:clrMapOvr>
-  <p:timing>
-    <p:tnLst>
-      <p:par>
-        <p:cTn id="1" dur="indefinite" restart="never" nodeType="tmRoot"/>
-      </p:par>
-    </p:tnLst>
-  </p:timing>
 </p:sld>
 </file>
 
@@ -7499,16 +7609,12 @@
           <a:lstStyle/>
           <a:p>
             <a:r>
-              <a:rPr lang="en-US" sz="2800" b="1" dirty="0" smtClean="0">
+              <a:rPr lang="en-US" sz="2800" b="1" dirty="0">
                 <a:latin typeface="Times New Roman" panose="02020603050405020304" pitchFamily="18" charset="0"/>
                 <a:cs typeface="Times New Roman" panose="02020603050405020304" pitchFamily="18" charset="0"/>
               </a:rPr>
               <a:t>	STOCK PREDICTION APPLICATION</a:t>
             </a:r>
-            <a:endParaRPr lang="en-US" sz="2800" b="1" dirty="0">
-              <a:latin typeface="Times New Roman" panose="02020603050405020304" pitchFamily="18" charset="0"/>
-              <a:cs typeface="Times New Roman" panose="02020603050405020304" pitchFamily="18" charset="0"/>
-            </a:endParaRPr>
           </a:p>
         </p:txBody>
       </p:sp>
@@ -7537,13 +7643,13 @@
             <a:pPr marL="0" indent="0">
               <a:buNone/>
             </a:pPr>
-            <a:endParaRPr lang="en-US" dirty="0" smtClean="0"/>
+            <a:endParaRPr lang="en-US" dirty="0"/>
           </a:p>
           <a:p>
             <a:pPr marL="0" indent="0">
               <a:buNone/>
             </a:pPr>
-            <a:endParaRPr lang="en-US" dirty="0" smtClean="0"/>
+            <a:endParaRPr lang="en-US" dirty="0"/>
           </a:p>
           <a:p>
             <a:endParaRPr lang="en-US" dirty="0"/>
@@ -7657,13 +7763,6 @@
   <p:clrMapOvr>
     <a:masterClrMapping/>
   </p:clrMapOvr>
-  <p:timing>
-    <p:tnLst>
-      <p:par>
-        <p:cTn id="1" dur="indefinite" restart="never" nodeType="tmRoot"/>
-      </p:par>
-    </p:tnLst>
-  </p:timing>
 </p:sld>
 </file>
 
@@ -7707,16 +7806,12 @@
           <a:lstStyle/>
           <a:p>
             <a:r>
-              <a:rPr lang="en-US" sz="3600" dirty="0" smtClean="0">
+              <a:rPr lang="en-US" sz="3600" dirty="0">
                 <a:latin typeface="Times New Roman" panose="02020603050405020304" pitchFamily="18" charset="0"/>
                 <a:cs typeface="Times New Roman" panose="02020603050405020304" pitchFamily="18" charset="0"/>
               </a:rPr>
               <a:t>STEPS FOLLOWED</a:t>
             </a:r>
-            <a:endParaRPr lang="en-US" sz="3600" dirty="0">
-              <a:latin typeface="Times New Roman" panose="02020603050405020304" pitchFamily="18" charset="0"/>
-              <a:cs typeface="Times New Roman" panose="02020603050405020304" pitchFamily="18" charset="0"/>
-            </a:endParaRPr>
           </a:p>
         </p:txBody>
       </p:sp>
@@ -7743,7 +7838,7 @@
           <a:lstStyle/>
           <a:p>
             <a:r>
-              <a:rPr lang="en-US" sz="4500" dirty="0" smtClean="0">
+              <a:rPr lang="en-US" sz="4500" dirty="0">
                 <a:latin typeface="Times New Roman" panose="02020603050405020304" pitchFamily="18" charset="0"/>
                 <a:cs typeface="Times New Roman" panose="02020603050405020304" pitchFamily="18" charset="0"/>
               </a:rPr>
@@ -7755,7 +7850,7 @@
               <a:buNone/>
             </a:pPr>
             <a:r>
-              <a:rPr lang="en-US" sz="4500" dirty="0" smtClean="0">
+              <a:rPr lang="en-US" sz="4500" dirty="0">
                 <a:latin typeface="Times New Roman" panose="02020603050405020304" pitchFamily="18" charset="0"/>
                 <a:cs typeface="Times New Roman" panose="02020603050405020304" pitchFamily="18" charset="0"/>
               </a:rPr>
@@ -7764,13 +7859,13 @@
           </a:p>
           <a:p>
             <a:r>
-              <a:rPr lang="en-US" sz="4500" dirty="0" smtClean="0">
+              <a:rPr lang="en-US" sz="4500" dirty="0">
                 <a:latin typeface="Times New Roman" panose="02020603050405020304" pitchFamily="18" charset="0"/>
                 <a:cs typeface="Times New Roman" panose="02020603050405020304" pitchFamily="18" charset="0"/>
               </a:rPr>
               <a:t>Model Prediction:</a:t>
             </a:r>
-            <a:endParaRPr lang="en-US" sz="4500" dirty="0" smtClean="0">
+            <a:endParaRPr lang="en-US" sz="4500" dirty="0">
               <a:effectLst/>
               <a:latin typeface="Times New Roman" panose="02020603050405020304" pitchFamily="18" charset="0"/>
               <a:cs typeface="Times New Roman" panose="02020603050405020304" pitchFamily="18" charset="0"/>
@@ -7858,7 +7953,7 @@
           </a:p>
           <a:p>
             <a:r>
-              <a:rPr lang="en-US" sz="4500" dirty="0" smtClean="0">
+              <a:rPr lang="en-US" sz="4500" dirty="0">
                 <a:latin typeface="Times New Roman" panose="02020603050405020304" pitchFamily="18" charset="0"/>
                 <a:cs typeface="Times New Roman" panose="02020603050405020304" pitchFamily="18" charset="0"/>
               </a:rPr>
@@ -7870,7 +7965,7 @@
               <a:buNone/>
             </a:pPr>
             <a:r>
-              <a:rPr lang="en-US" sz="4500" dirty="0" smtClean="0">
+              <a:rPr lang="en-US" sz="4500" dirty="0">
                 <a:latin typeface="Times New Roman" panose="02020603050405020304" pitchFamily="18" charset="0"/>
                 <a:cs typeface="Times New Roman" panose="02020603050405020304" pitchFamily="18" charset="0"/>
               </a:rPr>
@@ -7879,7 +7974,7 @@
           </a:p>
           <a:p>
             <a:r>
-              <a:rPr lang="en-US" sz="4500" dirty="0" smtClean="0">
+              <a:rPr lang="en-US" sz="4500" dirty="0">
                 <a:latin typeface="Times New Roman" panose="02020603050405020304" pitchFamily="18" charset="0"/>
                 <a:cs typeface="Times New Roman" panose="02020603050405020304" pitchFamily="18" charset="0"/>
               </a:rPr>
@@ -7891,7 +7986,7 @@
               <a:buNone/>
             </a:pPr>
             <a:r>
-              <a:rPr lang="en-US" sz="4500" dirty="0" smtClean="0">
+              <a:rPr lang="en-US" sz="4500" dirty="0">
                 <a:latin typeface="Times New Roman" panose="02020603050405020304" pitchFamily="18" charset="0"/>
                 <a:cs typeface="Times New Roman" panose="02020603050405020304" pitchFamily="18" charset="0"/>
               </a:rPr>
@@ -7902,13 +7997,13 @@
             <a:pPr marL="0" indent="0">
               <a:buNone/>
             </a:pPr>
-            <a:endParaRPr lang="en-US" dirty="0" smtClean="0"/>
+            <a:endParaRPr lang="en-US" dirty="0"/>
           </a:p>
           <a:p>
             <a:pPr marL="0" indent="0">
               <a:buNone/>
             </a:pPr>
-            <a:endParaRPr lang="en-US" dirty="0" smtClean="0"/>
+            <a:endParaRPr lang="en-US" dirty="0"/>
           </a:p>
           <a:p>
             <a:endParaRPr lang="en-US" dirty="0"/>
@@ -7948,13 +8043,6 @@
   <p:clrMapOvr>
     <a:masterClrMapping/>
   </p:clrMapOvr>
-  <p:timing>
-    <p:tnLst>
-      <p:par>
-        <p:cTn id="1" dur="indefinite" restart="never" nodeType="tmRoot"/>
-      </p:par>
-    </p:tnLst>
-  </p:timing>
 </p:sld>
 </file>
 
@@ -7998,16 +8086,12 @@
           <a:lstStyle/>
           <a:p>
             <a:r>
-              <a:rPr lang="en-US" sz="4000" dirty="0" smtClean="0">
+              <a:rPr lang="en-US" sz="4000" dirty="0">
                 <a:latin typeface="Times New Roman" panose="02020603050405020304" pitchFamily="18" charset="0"/>
                 <a:cs typeface="Times New Roman" panose="02020603050405020304" pitchFamily="18" charset="0"/>
               </a:rPr>
               <a:t>Stock Prediction Application</a:t>
             </a:r>
-            <a:endParaRPr lang="en-US" sz="4000" dirty="0">
-              <a:latin typeface="Times New Roman" panose="02020603050405020304" pitchFamily="18" charset="0"/>
-              <a:cs typeface="Times New Roman" panose="02020603050405020304" pitchFamily="18" charset="0"/>
-            </a:endParaRPr>
           </a:p>
         </p:txBody>
       </p:sp>
@@ -8073,13 +8157,6 @@
   <p:clrMapOvr>
     <a:masterClrMapping/>
   </p:clrMapOvr>
-  <p:timing>
-    <p:tnLst>
-      <p:par>
-        <p:cTn id="1" dur="indefinite" restart="never" nodeType="tmRoot"/>
-      </p:par>
-    </p:tnLst>
-  </p:timing>
 </p:sld>
 </file>
 
@@ -8123,16 +8200,12 @@
           <a:lstStyle/>
           <a:p>
             <a:r>
-              <a:rPr lang="en-US" sz="4000" dirty="0" smtClean="0">
+              <a:rPr lang="en-US" sz="4000" dirty="0">
                 <a:latin typeface="Times New Roman" panose="02020603050405020304" pitchFamily="18" charset="0"/>
                 <a:cs typeface="Times New Roman" panose="02020603050405020304" pitchFamily="18" charset="0"/>
               </a:rPr>
               <a:t>Stock Prediction Application - Docker</a:t>
             </a:r>
-            <a:endParaRPr lang="en-US" sz="4000" dirty="0">
-              <a:latin typeface="Times New Roman" panose="02020603050405020304" pitchFamily="18" charset="0"/>
-              <a:cs typeface="Times New Roman" panose="02020603050405020304" pitchFamily="18" charset="0"/>
-            </a:endParaRPr>
           </a:p>
         </p:txBody>
       </p:sp>
@@ -8198,13 +8271,6 @@
   <p:clrMapOvr>
     <a:masterClrMapping/>
   </p:clrMapOvr>
-  <p:timing>
-    <p:tnLst>
-      <p:par>
-        <p:cTn id="1" dur="indefinite" restart="never" nodeType="tmRoot"/>
-      </p:par>
-    </p:tnLst>
-  </p:timing>
 </p:sld>
 </file>
 
@@ -8248,16 +8314,12 @@
           <a:lstStyle/>
           <a:p>
             <a:r>
-              <a:rPr lang="en-US" sz="3600" dirty="0" smtClean="0">
+              <a:rPr lang="en-US" sz="3600" dirty="0">
                 <a:latin typeface="Times New Roman" panose="02020603050405020304" pitchFamily="18" charset="0"/>
                 <a:cs typeface="Times New Roman" panose="02020603050405020304" pitchFamily="18" charset="0"/>
               </a:rPr>
               <a:t>Stock Prediction Application - Kafka </a:t>
             </a:r>
-            <a:endParaRPr lang="en-US" sz="3600" dirty="0">
-              <a:latin typeface="Times New Roman" panose="02020603050405020304" pitchFamily="18" charset="0"/>
-              <a:cs typeface="Times New Roman" panose="02020603050405020304" pitchFamily="18" charset="0"/>
-            </a:endParaRPr>
           </a:p>
         </p:txBody>
       </p:sp>
@@ -8337,13 +8399,6 @@
   <p:clrMapOvr>
     <a:masterClrMapping/>
   </p:clrMapOvr>
-  <p:timing>
-    <p:tnLst>
-      <p:par>
-        <p:cTn id="1" dur="indefinite" restart="never" nodeType="tmRoot"/>
-      </p:par>
-    </p:tnLst>
-  </p:timing>
 </p:sld>
 </file>
 
@@ -8387,16 +8442,12 @@
           <a:lstStyle/>
           <a:p>
             <a:r>
-              <a:rPr lang="en-US" sz="3600" dirty="0" smtClean="0">
+              <a:rPr lang="en-US" sz="3600" dirty="0">
                 <a:latin typeface="Times New Roman" panose="02020603050405020304" pitchFamily="18" charset="0"/>
                 <a:cs typeface="Times New Roman" panose="02020603050405020304" pitchFamily="18" charset="0"/>
               </a:rPr>
               <a:t>Stock Prediction Application - Kafka </a:t>
             </a:r>
-            <a:endParaRPr lang="en-US" sz="3600" dirty="0">
-              <a:latin typeface="Times New Roman" panose="02020603050405020304" pitchFamily="18" charset="0"/>
-              <a:cs typeface="Times New Roman" panose="02020603050405020304" pitchFamily="18" charset="0"/>
-            </a:endParaRPr>
           </a:p>
         </p:txBody>
       </p:sp>
@@ -8474,13 +8525,6 @@
   <p:clrMapOvr>
     <a:masterClrMapping/>
   </p:clrMapOvr>
-  <p:timing>
-    <p:tnLst>
-      <p:par>
-        <p:cTn id="1" dur="indefinite" restart="never" nodeType="tmRoot"/>
-      </p:par>
-    </p:tnLst>
-  </p:timing>
 </p:sld>
 </file>
 
@@ -8524,16 +8568,12 @@
           <a:lstStyle/>
           <a:p>
             <a:r>
-              <a:rPr lang="en-US" sz="3600" dirty="0" smtClean="0">
+              <a:rPr lang="en-US" sz="3600" dirty="0">
                 <a:latin typeface="Times New Roman" panose="02020603050405020304" pitchFamily="18" charset="0"/>
                 <a:cs typeface="Times New Roman" panose="02020603050405020304" pitchFamily="18" charset="0"/>
               </a:rPr>
               <a:t>Stock Prediction Application - Kafka prediction </a:t>
             </a:r>
-            <a:endParaRPr lang="en-US" sz="3600" dirty="0">
-              <a:latin typeface="Times New Roman" panose="02020603050405020304" pitchFamily="18" charset="0"/>
-              <a:cs typeface="Times New Roman" panose="02020603050405020304" pitchFamily="18" charset="0"/>
-            </a:endParaRPr>
           </a:p>
         </p:txBody>
       </p:sp>
@@ -8600,13 +8640,6 @@
   <p:clrMapOvr>
     <a:masterClrMapping/>
   </p:clrMapOvr>
-  <p:timing>
-    <p:tnLst>
-      <p:par>
-        <p:cTn id="1" dur="indefinite" restart="never" nodeType="tmRoot"/>
-      </p:par>
-    </p:tnLst>
-  </p:timing>
 </p:sld>
 </file>
 
@@ -8648,7 +8681,7 @@
           <a:lstStyle/>
           <a:p>
             <a:r>
-              <a:rPr lang="en-US" dirty="0" err="1" smtClean="0"/>
+              <a:rPr lang="en-US" dirty="0" err="1"/>
               <a:t>PySpark</a:t>
             </a:r>
             <a:endParaRPr lang="en-US" dirty="0"/>

</xml_diff>

<commit_message>
Formatting changes and updates
</commit_message>
<xml_diff>
--- a/DSE 6300- Project Presentation.pptx
+++ b/DSE 6300- Project Presentation.pptx
@@ -5,24 +5,25 @@
     <p:sldMasterId id="2147483678" r:id="rId1"/>
   </p:sldMasterIdLst>
   <p:notesMasterIdLst>
-    <p:notesMasterId r:id="rId17"/>
+    <p:notesMasterId r:id="rId18"/>
   </p:notesMasterIdLst>
   <p:sldIdLst>
     <p:sldId id="256" r:id="rId2"/>
-    <p:sldId id="258" r:id="rId3"/>
-    <p:sldId id="271" r:id="rId4"/>
+    <p:sldId id="281" r:id="rId3"/>
+    <p:sldId id="282" r:id="rId4"/>
     <p:sldId id="260" r:id="rId5"/>
     <p:sldId id="261" r:id="rId6"/>
     <p:sldId id="262" r:id="rId7"/>
-    <p:sldId id="268" r:id="rId8"/>
-    <p:sldId id="269" r:id="rId9"/>
+    <p:sldId id="279" r:id="rId8"/>
+    <p:sldId id="280" r:id="rId9"/>
     <p:sldId id="273" r:id="rId10"/>
-    <p:sldId id="272" r:id="rId11"/>
-    <p:sldId id="263" r:id="rId12"/>
-    <p:sldId id="264" r:id="rId13"/>
-    <p:sldId id="265" r:id="rId14"/>
-    <p:sldId id="274" r:id="rId15"/>
-    <p:sldId id="266" r:id="rId16"/>
+    <p:sldId id="275" r:id="rId11"/>
+    <p:sldId id="272" r:id="rId12"/>
+    <p:sldId id="277" r:id="rId13"/>
+    <p:sldId id="278" r:id="rId14"/>
+    <p:sldId id="265" r:id="rId15"/>
+    <p:sldId id="276" r:id="rId16"/>
+    <p:sldId id="266" r:id="rId17"/>
   </p:sldIdLst>
   <p:sldSz cx="12192000" cy="6858000"/>
   <p:notesSz cx="6858000" cy="9144000"/>
@@ -148,66 +149,6 @@
 </p1510:revInfo>
 </file>
 
-<file path=ppt/changesInfos/changesInfo1.xml><?xml version="1.0" encoding="utf-8"?>
-<pc:chgInfo xmlns:a="http://schemas.openxmlformats.org/drawingml/2006/main" xmlns:r="http://schemas.openxmlformats.org/officeDocument/2006/relationships" xmlns:ac="http://schemas.microsoft.com/office/drawing/2013/main/command" xmlns:pc="http://schemas.microsoft.com/office/powerpoint/2013/main/command">
-  <pc:docChgLst>
-    <pc:chgData name="Priya Pichai" userId="24548fc4fd954468" providerId="LiveId" clId="{3E48295F-6FF2-45A6-A770-0FE45C64B4F9}"/>
-    <pc:docChg chg="addSld modSld">
-      <pc:chgData name="Priya Pichai" userId="24548fc4fd954468" providerId="LiveId" clId="{3E48295F-6FF2-45A6-A770-0FE45C64B4F9}" dt="2022-04-25T14:16:22.888" v="116" actId="255"/>
-      <pc:docMkLst>
-        <pc:docMk/>
-      </pc:docMkLst>
-      <pc:sldChg chg="modSp mod">
-        <pc:chgData name="Priya Pichai" userId="24548fc4fd954468" providerId="LiveId" clId="{3E48295F-6FF2-45A6-A770-0FE45C64B4F9}" dt="2022-04-25T14:01:32.669" v="0" actId="20577"/>
-        <pc:sldMkLst>
-          <pc:docMk/>
-          <pc:sldMk cId="511202775" sldId="256"/>
-        </pc:sldMkLst>
-        <pc:spChg chg="mod">
-          <ac:chgData name="Priya Pichai" userId="24548fc4fd954468" providerId="LiveId" clId="{3E48295F-6FF2-45A6-A770-0FE45C64B4F9}" dt="2022-04-25T14:01:32.669" v="0" actId="20577"/>
-          <ac:spMkLst>
-            <pc:docMk/>
-            <pc:sldMk cId="511202775" sldId="256"/>
-            <ac:spMk id="3" creationId="{00000000-0000-0000-0000-000000000000}"/>
-          </ac:spMkLst>
-        </pc:spChg>
-      </pc:sldChg>
-      <pc:sldChg chg="addSp delSp modSp add mod">
-        <pc:chgData name="Priya Pichai" userId="24548fc4fd954468" providerId="LiveId" clId="{3E48295F-6FF2-45A6-A770-0FE45C64B4F9}" dt="2022-04-25T14:16:22.888" v="116" actId="255"/>
-        <pc:sldMkLst>
-          <pc:docMk/>
-          <pc:sldMk cId="2856388626" sldId="274"/>
-        </pc:sldMkLst>
-        <pc:spChg chg="mod">
-          <ac:chgData name="Priya Pichai" userId="24548fc4fd954468" providerId="LiveId" clId="{3E48295F-6FF2-45A6-A770-0FE45C64B4F9}" dt="2022-04-25T14:12:53.776" v="39" actId="20577"/>
-          <ac:spMkLst>
-            <pc:docMk/>
-            <pc:sldMk cId="2856388626" sldId="274"/>
-            <ac:spMk id="2" creationId="{00000000-0000-0000-0000-000000000000}"/>
-          </ac:spMkLst>
-        </pc:spChg>
-        <pc:spChg chg="add mod">
-          <ac:chgData name="Priya Pichai" userId="24548fc4fd954468" providerId="LiveId" clId="{3E48295F-6FF2-45A6-A770-0FE45C64B4F9}" dt="2022-04-25T14:16:22.888" v="116" actId="255"/>
-          <ac:spMkLst>
-            <pc:docMk/>
-            <pc:sldMk cId="2856388626" sldId="274"/>
-            <ac:spMk id="3" creationId="{E8E56DEB-1EDF-4218-92F3-85CA8ADE9895}"/>
-          </ac:spMkLst>
-        </pc:spChg>
-        <pc:spChg chg="del mod">
-          <ac:chgData name="Priya Pichai" userId="24548fc4fd954468" providerId="LiveId" clId="{3E48295F-6FF2-45A6-A770-0FE45C64B4F9}" dt="2022-04-25T14:12:55.230" v="41"/>
-          <ac:spMkLst>
-            <pc:docMk/>
-            <pc:sldMk cId="2856388626" sldId="274"/>
-            <ac:spMk id="4" creationId="{00000000-0000-0000-0000-000000000000}"/>
-          </ac:spMkLst>
-        </pc:spChg>
-      </pc:sldChg>
-    </pc:docChg>
-  </pc:docChgLst>
-</pc:chgInfo>
-</file>
-
 <file path=ppt/notesMasters/notesMaster1.xml><?xml version="1.0" encoding="utf-8"?>
 <p:notesMaster xmlns:a="http://schemas.openxmlformats.org/drawingml/2006/main" xmlns:r="http://schemas.openxmlformats.org/officeDocument/2006/relationships" xmlns:p="http://schemas.openxmlformats.org/presentationml/2006/main">
   <p:cSld>
@@ -290,7 +231,7 @@
           <a:p>
             <a:fld id="{912BF297-3D07-4118-B915-1667A1AC3BEE}" type="datetimeFigureOut">
               <a:rPr lang="en-US" smtClean="0"/>
-              <a:t>4/25/2022</a:t>
+              <a:t>4/25/22</a:t>
             </a:fld>
             <a:endParaRPr lang="en-US"/>
           </a:p>
@@ -1143,7 +1084,7 @@
           <a:p>
             <a:fld id="{4BF1FF1A-9F5E-40D9-8453-DB8198BC6686}" type="datetime1">
               <a:rPr lang="en-US" smtClean="0"/>
-              <a:t>4/25/2022</a:t>
+              <a:t>4/25/22</a:t>
             </a:fld>
             <a:endParaRPr lang="en-US"/>
           </a:p>
@@ -1439,7 +1380,7 @@
           <a:p>
             <a:fld id="{D7A3863A-CCEC-45B1-B0AE-2444D99B5F3D}" type="datetime1">
               <a:rPr lang="en-US" smtClean="0"/>
-              <a:t>4/25/2022</a:t>
+              <a:t>4/25/22</a:t>
             </a:fld>
             <a:endParaRPr lang="en-US"/>
           </a:p>
@@ -1687,7 +1628,7 @@
           <a:p>
             <a:fld id="{DB39090A-01B4-4495-A157-5589BD10BE03}" type="datetime1">
               <a:rPr lang="en-US" smtClean="0"/>
-              <a:t>4/25/2022</a:t>
+              <a:t>4/25/22</a:t>
             </a:fld>
             <a:endParaRPr lang="en-US"/>
           </a:p>
@@ -2227,7 +2168,7 @@
           <a:p>
             <a:fld id="{7089D775-5E9B-4629-9D96-EF51071362CD}" type="datetime1">
               <a:rPr lang="en-US" smtClean="0"/>
-              <a:t>4/25/2022</a:t>
+              <a:t>4/25/22</a:t>
             </a:fld>
             <a:endParaRPr lang="en-US"/>
           </a:p>
@@ -2475,7 +2416,7 @@
           <a:p>
             <a:fld id="{BD43C69F-02AB-495C-A550-ADA3A622B671}" type="datetime1">
               <a:rPr lang="en-US" smtClean="0"/>
-              <a:t>4/25/2022</a:t>
+              <a:t>4/25/22</a:t>
             </a:fld>
             <a:endParaRPr lang="en-US"/>
           </a:p>
@@ -3007,7 +2948,7 @@
           <a:p>
             <a:fld id="{9085FE1B-0024-4062-BEC7-AA04B1A77233}" type="datetime1">
               <a:rPr lang="en-US" smtClean="0"/>
-              <a:t>4/25/2022</a:t>
+              <a:t>4/25/22</a:t>
             </a:fld>
             <a:endParaRPr lang="en-US"/>
           </a:p>
@@ -3304,7 +3245,7 @@
           <a:p>
             <a:fld id="{E713B749-F4B4-4E13-B331-4987C017D17F}" type="datetime1">
               <a:rPr lang="en-US" smtClean="0"/>
-              <a:t>4/25/2022</a:t>
+              <a:t>4/25/22</a:t>
             </a:fld>
             <a:endParaRPr lang="en-US"/>
           </a:p>
@@ -3478,7 +3419,7 @@
           <a:p>
             <a:fld id="{9DED7DAA-E179-402F-B9EA-F2814A1F0C05}" type="datetime1">
               <a:rPr lang="en-US" smtClean="0"/>
-              <a:t>4/25/2022</a:t>
+              <a:t>4/25/22</a:t>
             </a:fld>
             <a:endParaRPr lang="en-US"/>
           </a:p>
@@ -3658,7 +3599,7 @@
           <a:p>
             <a:fld id="{190E398C-8B50-498A-8BCD-C638365344AD}" type="datetime1">
               <a:rPr lang="en-US" smtClean="0"/>
-              <a:t>4/25/2022</a:t>
+              <a:t>4/25/22</a:t>
             </a:fld>
             <a:endParaRPr lang="en-US"/>
           </a:p>
@@ -3828,7 +3769,7 @@
           <a:p>
             <a:fld id="{6CAD799B-A048-4505-AE75-77008D357C86}" type="datetime1">
               <a:rPr lang="en-US" smtClean="0"/>
-              <a:t>4/25/2022</a:t>
+              <a:t>4/25/22</a:t>
             </a:fld>
             <a:endParaRPr lang="en-US"/>
           </a:p>
@@ -4079,7 +4020,7 @@
           <a:p>
             <a:fld id="{AD45542A-0B6B-4EB5-93E4-2AA0E3781316}" type="datetime1">
               <a:rPr lang="en-US" smtClean="0"/>
-              <a:t>4/25/2022</a:t>
+              <a:t>4/25/22</a:t>
             </a:fld>
             <a:endParaRPr lang="en-US"/>
           </a:p>
@@ -4376,7 +4317,7 @@
           <a:p>
             <a:fld id="{F6A2A841-8FAB-43A3-9102-46C6D950EA4B}" type="datetime1">
               <a:rPr lang="en-US" smtClean="0"/>
-              <a:t>4/25/2022</a:t>
+              <a:t>4/25/22</a:t>
             </a:fld>
             <a:endParaRPr lang="en-US"/>
           </a:p>
@@ -4818,7 +4759,7 @@
           <a:p>
             <a:fld id="{68BA6A83-CFAF-4164-9050-5BB6942A0D8D}" type="datetime1">
               <a:rPr lang="en-US" smtClean="0"/>
-              <a:t>4/25/2022</a:t>
+              <a:t>4/25/22</a:t>
             </a:fld>
             <a:endParaRPr lang="en-US"/>
           </a:p>
@@ -4936,7 +4877,7 @@
           <a:p>
             <a:fld id="{9BE354EA-D510-4423-89F2-24F4C1BC5BB4}" type="datetime1">
               <a:rPr lang="en-US" smtClean="0"/>
-              <a:t>4/25/2022</a:t>
+              <a:t>4/25/22</a:t>
             </a:fld>
             <a:endParaRPr lang="en-US"/>
           </a:p>
@@ -5031,7 +4972,7 @@
           <a:p>
             <a:fld id="{B063806C-A650-44E9-9C81-FB6A19EA0B97}" type="datetime1">
               <a:rPr lang="en-US" smtClean="0"/>
-              <a:t>4/25/2022</a:t>
+              <a:t>4/25/22</a:t>
             </a:fld>
             <a:endParaRPr lang="en-US"/>
           </a:p>
@@ -5314,7 +5255,7 @@
           <a:p>
             <a:fld id="{42028E69-8078-4787-B21E-2DF2BA837AA8}" type="datetime1">
               <a:rPr lang="en-US" smtClean="0"/>
-              <a:t>4/25/2022</a:t>
+              <a:t>4/25/22</a:t>
             </a:fld>
             <a:endParaRPr lang="en-US"/>
           </a:p>
@@ -5605,7 +5546,7 @@
           <a:p>
             <a:fld id="{05849163-CBAE-490C-AEBD-534B94453176}" type="datetime1">
               <a:rPr lang="en-US" smtClean="0"/>
-              <a:t>4/25/2022</a:t>
+              <a:t>4/25/22</a:t>
             </a:fld>
             <a:endParaRPr lang="en-US"/>
           </a:p>
@@ -6135,7 +6076,7 @@
           <a:p>
             <a:fld id="{F8588326-732E-4529-A246-6629552950EB}" type="datetime1">
               <a:rPr lang="en-US" smtClean="0"/>
-              <a:t>4/25/2022</a:t>
+              <a:t>4/25/22</a:t>
             </a:fld>
             <a:endParaRPr lang="en-US"/>
           </a:p>
@@ -6679,8 +6620,8 @@
         </p:nvSpPr>
         <p:spPr>
           <a:xfrm>
-            <a:off x="1524000" y="622301"/>
-            <a:ext cx="9144000" cy="1181099"/>
+            <a:off x="2681198" y="533401"/>
+            <a:ext cx="9079002" cy="1181099"/>
           </a:xfrm>
         </p:spPr>
         <p:txBody>
@@ -6711,8 +6652,8 @@
         </p:nvSpPr>
         <p:spPr>
           <a:xfrm>
-            <a:off x="1524000" y="2324100"/>
-            <a:ext cx="9144000" cy="2933700"/>
+            <a:off x="1919514" y="2062843"/>
+            <a:ext cx="9840686" cy="4533900"/>
           </a:xfrm>
         </p:spPr>
         <p:txBody>
@@ -6722,12 +6663,18 @@
           <a:lstStyle/>
           <a:p>
             <a:r>
-              <a:rPr lang="en-US" sz="2200" b="1" dirty="0">
+              <a:rPr lang="en-US" sz="2800" b="1" dirty="0">
                 <a:latin typeface="Times New Roman" panose="02020603050405020304" pitchFamily="18" charset="0"/>
                 <a:cs typeface="Times New Roman" panose="02020603050405020304" pitchFamily="18" charset="0"/>
               </a:rPr>
               <a:t>FINAL PROJECT - Stock Prediction Application</a:t>
             </a:r>
+          </a:p>
+          <a:p>
+            <a:endParaRPr lang="en-US" sz="2800" dirty="0">
+              <a:latin typeface="Times New Roman" panose="02020603050405020304" pitchFamily="18" charset="0"/>
+              <a:cs typeface="Times New Roman" panose="02020603050405020304" pitchFamily="18" charset="0"/>
+            </a:endParaRPr>
           </a:p>
           <a:p>
             <a:endParaRPr lang="en-US" sz="2800" dirty="0">
@@ -6871,38 +6818,59 @@
             <p:ph type="title"/>
           </p:nvPr>
         </p:nvSpPr>
-        <p:spPr/>
+        <p:spPr>
+          <a:xfrm>
+            <a:off x="1769423" y="371096"/>
+            <a:ext cx="10422577" cy="863600"/>
+          </a:xfrm>
+        </p:spPr>
         <p:txBody>
           <a:bodyPr>
-            <a:normAutofit fontScale="90000"/>
+            <a:normAutofit/>
           </a:bodyPr>
           <a:lstStyle/>
           <a:p>
-            <a:br>
-              <a:rPr lang="en-US" dirty="0"/>
-            </a:br>
-            <a:br>
-              <a:rPr lang="en-US" dirty="0"/>
-            </a:br>
-            <a:br>
-              <a:rPr lang="en-US" dirty="0"/>
-            </a:br>
-            <a:br>
-              <a:rPr lang="en-US" dirty="0"/>
-            </a:br>
-            <a:br>
-              <a:rPr lang="en-US" dirty="0"/>
-            </a:br>
-            <a:br>
-              <a:rPr lang="en-US" dirty="0"/>
-            </a:br>
-            <a:r>
-              <a:rPr lang="en-US" sz="8000" dirty="0"/>
-              <a:t>LIVE DEMO</a:t>
-            </a:r>
-          </a:p>
-        </p:txBody>
-      </p:sp>
+            <a:r>
+              <a:rPr lang="en-US" sz="4800" dirty="0" err="1">
+                <a:latin typeface="Times" pitchFamily="2" charset="0"/>
+              </a:rPr>
+              <a:t>PySpark</a:t>
+            </a:r>
+            <a:endParaRPr lang="en-US" sz="4800" dirty="0">
+              <a:latin typeface="Times" pitchFamily="2" charset="0"/>
+            </a:endParaRPr>
+          </a:p>
+        </p:txBody>
+      </p:sp>
+      <p:pic>
+        <p:nvPicPr>
+          <p:cNvPr id="5" name="Content Placeholder 4"/>
+          <p:cNvPicPr>
+            <a:picLocks noGrp="1" noChangeAspect="1"/>
+          </p:cNvPicPr>
+          <p:nvPr>
+            <p:ph idx="1"/>
+          </p:nvPr>
+        </p:nvPicPr>
+        <p:blipFill>
+          <a:blip r:embed="rId2">
+            <a:extLst>
+              <a:ext uri="{28A0092B-C50C-407E-A947-70E740481C1C}">
+                <a14:useLocalDpi xmlns:a14="http://schemas.microsoft.com/office/drawing/2010/main" val="0"/>
+              </a:ext>
+            </a:extLst>
+          </a:blip>
+          <a:stretch>
+            <a:fillRect/>
+          </a:stretch>
+        </p:blipFill>
+        <p:spPr>
+          <a:xfrm>
+            <a:off x="369404" y="1234696"/>
+            <a:ext cx="5029200" cy="3182894"/>
+          </a:xfrm>
+        </p:spPr>
+      </p:pic>
       <p:sp>
         <p:nvSpPr>
           <p:cNvPr id="4" name="Slide Number Placeholder 3"/>
@@ -6926,10 +6894,40 @@
           </a:p>
         </p:txBody>
       </p:sp>
+      <p:pic>
+        <p:nvPicPr>
+          <p:cNvPr id="6" name="Picture 5"/>
+          <p:cNvPicPr>
+            <a:picLocks noChangeAspect="1"/>
+          </p:cNvPicPr>
+          <p:nvPr/>
+        </p:nvPicPr>
+        <p:blipFill>
+          <a:blip r:embed="rId3">
+            <a:extLst>
+              <a:ext uri="{28A0092B-C50C-407E-A947-70E740481C1C}">
+                <a14:useLocalDpi xmlns:a14="http://schemas.microsoft.com/office/drawing/2010/main" val="0"/>
+              </a:ext>
+            </a:extLst>
+          </a:blip>
+          <a:stretch>
+            <a:fillRect/>
+          </a:stretch>
+        </p:blipFill>
+        <p:spPr>
+          <a:xfrm>
+            <a:off x="5539280" y="3675888"/>
+            <a:ext cx="6518821" cy="3182112"/>
+          </a:xfrm>
+          <a:prstGeom prst="rect">
+            <a:avLst/>
+          </a:prstGeom>
+        </p:spPr>
+      </p:pic>
     </p:spTree>
     <p:extLst>
       <p:ext uri="{BB962C8B-B14F-4D97-AF65-F5344CB8AC3E}">
-        <p14:creationId xmlns:p14="http://schemas.microsoft.com/office/powerpoint/2010/main" val="3211914026"/>
+        <p14:creationId xmlns:p14="http://schemas.microsoft.com/office/powerpoint/2010/main" val="1162594216"/>
       </p:ext>
     </p:extLst>
   </p:cSld>
@@ -6968,8 +6966,8 @@
         </p:nvSpPr>
         <p:spPr>
           <a:xfrm>
-            <a:off x="1484311" y="215901"/>
-            <a:ext cx="10018713" cy="1003299"/>
+            <a:off x="1591295" y="0"/>
+            <a:ext cx="10600706" cy="1752599"/>
           </a:xfrm>
         </p:spPr>
         <p:txBody>
@@ -6979,18 +6977,20 @@
           <a:lstStyle/>
           <a:p>
             <a:r>
-              <a:rPr lang="en-US" sz="4000" dirty="0">
-                <a:latin typeface="Times New Roman" panose="02020603050405020304" pitchFamily="18" charset="0"/>
-                <a:cs typeface="Times New Roman" panose="02020603050405020304" pitchFamily="18" charset="0"/>
+              <a:rPr lang="en-US" sz="4800" dirty="0">
+                <a:latin typeface="Times" pitchFamily="2" charset="0"/>
               </a:rPr>
-              <a:t>Trello</a:t>
-            </a:r>
-          </a:p>
-        </p:txBody>
-      </p:sp>
-      <p:sp>
-        <p:nvSpPr>
-          <p:cNvPr id="7" name="Slide Number Placeholder 6"/>
+              <a:t>Live Project Demonstration</a:t>
+            </a:r>
+            <a:endParaRPr lang="en-US" sz="9600" dirty="0">
+              <a:latin typeface="Times" pitchFamily="2" charset="0"/>
+            </a:endParaRPr>
+          </a:p>
+        </p:txBody>
+      </p:sp>
+      <p:sp>
+        <p:nvSpPr>
+          <p:cNvPr id="4" name="Slide Number Placeholder 3"/>
           <p:cNvSpPr>
             <a:spLocks noGrp="1"/>
           </p:cNvSpPr>
@@ -7011,39 +7011,10 @@
           </a:p>
         </p:txBody>
       </p:sp>
-      <p:pic>
-        <p:nvPicPr>
-          <p:cNvPr id="5" name="Content Placeholder 4"/>
-          <p:cNvPicPr>
-            <a:picLocks noGrp="1" noChangeAspect="1"/>
-          </p:cNvPicPr>
-          <p:nvPr>
-            <p:ph idx="1"/>
-          </p:nvPr>
-        </p:nvPicPr>
-        <p:blipFill>
-          <a:blip r:embed="rId2">
-            <a:extLst>
-              <a:ext uri="{28A0092B-C50C-407E-A947-70E740481C1C}">
-                <a14:useLocalDpi xmlns:a14="http://schemas.microsoft.com/office/drawing/2010/main" val="0"/>
-              </a:ext>
-            </a:extLst>
-          </a:blip>
-          <a:stretch>
-            <a:fillRect/>
-          </a:stretch>
-        </p:blipFill>
-        <p:spPr>
-          <a:xfrm>
-            <a:off x="1520614" y="1219200"/>
-            <a:ext cx="9946105" cy="4572000"/>
-          </a:xfrm>
-        </p:spPr>
-      </p:pic>
     </p:spTree>
     <p:extLst>
       <p:ext uri="{BB962C8B-B14F-4D97-AF65-F5344CB8AC3E}">
-        <p14:creationId xmlns:p14="http://schemas.microsoft.com/office/powerpoint/2010/main" val="1505406896"/>
+        <p14:creationId xmlns:p14="http://schemas.microsoft.com/office/powerpoint/2010/main" val="3211914026"/>
       </p:ext>
     </p:extLst>
   </p:cSld>
@@ -7082,41 +7053,34 @@
         </p:nvSpPr>
         <p:spPr>
           <a:xfrm>
-            <a:off x="1466363" y="345831"/>
-            <a:ext cx="10018713" cy="698499"/>
+            <a:off x="2173287" y="100013"/>
+            <a:ext cx="10018713" cy="1003299"/>
           </a:xfrm>
         </p:spPr>
         <p:txBody>
           <a:bodyPr>
-            <a:normAutofit fontScale="90000"/>
+            <a:normAutofit/>
           </a:bodyPr>
           <a:lstStyle/>
           <a:p>
             <a:r>
-              <a:rPr lang="en-US" sz="4000" dirty="0" err="1">
+              <a:rPr lang="en-US" sz="4800" dirty="0">
                 <a:latin typeface="Times New Roman" panose="02020603050405020304" pitchFamily="18" charset="0"/>
                 <a:cs typeface="Times New Roman" panose="02020603050405020304" pitchFamily="18" charset="0"/>
               </a:rPr>
-              <a:t>Git</a:t>
-            </a:r>
-            <a:r>
-              <a:rPr lang="en-US" sz="4000" dirty="0">
-                <a:latin typeface="Times New Roman" panose="02020603050405020304" pitchFamily="18" charset="0"/>
-                <a:cs typeface="Times New Roman" panose="02020603050405020304" pitchFamily="18" charset="0"/>
-              </a:rPr>
-              <a:t> Hub</a:t>
-            </a:r>
-          </a:p>
-        </p:txBody>
-      </p:sp>
-      <p:sp>
-        <p:nvSpPr>
-          <p:cNvPr id="3" name="Content Placeholder 2"/>
-          <p:cNvSpPr>
-            <a:spLocks noGrp="1"/>
-          </p:cNvSpPr>
-          <p:nvPr>
-            <p:ph idx="1"/>
+              <a:t>Trello</a:t>
+            </a:r>
+          </a:p>
+        </p:txBody>
+      </p:sp>
+      <p:sp>
+        <p:nvSpPr>
+          <p:cNvPr id="7" name="Slide Number Placeholder 6"/>
+          <p:cNvSpPr>
+            <a:spLocks noGrp="1"/>
+          </p:cNvSpPr>
+          <p:nvPr>
+            <p:ph type="sldNum" sz="quarter" idx="12"/>
           </p:nvPr>
         </p:nvSpPr>
         <p:spPr/>
@@ -7124,15 +7088,19 @@
           <a:bodyPr/>
           <a:lstStyle/>
           <a:p>
-            <a:endParaRPr lang="en-US" dirty="0"/>
+            <a:fld id="{126287E9-9858-4616-BEA9-2CF9CC01AF62}" type="slidenum">
+              <a:rPr lang="en-US" smtClean="0"/>
+              <a:t>12</a:t>
+            </a:fld>
+            <a:endParaRPr lang="en-US"/>
           </a:p>
         </p:txBody>
       </p:sp>
       <p:pic>
         <p:nvPicPr>
-          <p:cNvPr id="4" name="Picture 3"/>
+          <p:cNvPr id="1026" name="Picture 2" descr="C:\Users\apitchaikannu\Desktop\Trello.PNG"/>
           <p:cNvPicPr>
-            <a:picLocks noChangeAspect="1"/>
+            <a:picLocks noChangeAspect="1" noChangeArrowheads="1"/>
           </p:cNvPicPr>
           <p:nvPr/>
         </p:nvPicPr>
@@ -7144,82 +7112,35 @@
               </a:ext>
             </a:extLst>
           </a:blip>
+          <a:srcRect/>
           <a:stretch>
             <a:fillRect/>
           </a:stretch>
         </p:blipFill>
-        <p:spPr>
+        <p:spPr bwMode="auto">
           <a:xfrm>
-            <a:off x="1431917" y="1592775"/>
-            <a:ext cx="9889036" cy="4114800"/>
-          </a:xfrm>
-          <a:prstGeom prst="rect">
-            <a:avLst/>
-          </a:prstGeom>
-        </p:spPr>
-      </p:pic>
-      <p:sp>
-        <p:nvSpPr>
-          <p:cNvPr id="7" name="Slide Number Placeholder 6"/>
-          <p:cNvSpPr>
-            <a:spLocks noGrp="1"/>
-          </p:cNvSpPr>
-          <p:nvPr>
-            <p:ph type="sldNum" sz="quarter" idx="12"/>
-          </p:nvPr>
-        </p:nvSpPr>
-        <p:spPr/>
-        <p:txBody>
-          <a:bodyPr/>
-          <a:lstStyle/>
-          <a:p>
-            <a:fld id="{126287E9-9858-4616-BEA9-2CF9CC01AF62}" type="slidenum">
-              <a:rPr lang="en-US" smtClean="0"/>
-              <a:t>12</a:t>
-            </a:fld>
-            <a:endParaRPr lang="en-US"/>
-          </a:p>
-        </p:txBody>
-      </p:sp>
-      <p:sp>
-        <p:nvSpPr>
-          <p:cNvPr id="5" name="TextBox 4"/>
-          <p:cNvSpPr txBox="1"/>
-          <p:nvPr/>
-        </p:nvSpPr>
-        <p:spPr>
-          <a:xfrm>
-            <a:off x="2121877" y="1051952"/>
-            <a:ext cx="6518030" cy="646331"/>
+            <a:off x="1963285" y="1006249"/>
+            <a:ext cx="8510752" cy="5667160"/>
           </a:xfrm>
           <a:prstGeom prst="rect">
             <a:avLst/>
           </a:prstGeom>
           <a:noFill/>
+          <a:extLst>
+            <a:ext uri="{909E8E84-426E-40DD-AFC4-6F175D3DCCD1}">
+              <a14:hiddenFill xmlns:a14="http://schemas.microsoft.com/office/drawing/2010/main">
+                <a:solidFill>
+                  <a:srgbClr val="FFFFFF"/>
+                </a:solidFill>
+              </a14:hiddenFill>
+            </a:ext>
+          </a:extLst>
         </p:spPr>
-        <p:txBody>
-          <a:bodyPr wrap="square" rtlCol="0">
-            <a:spAutoFit/>
-          </a:bodyPr>
-          <a:lstStyle/>
-          <a:p>
-            <a:r>
-              <a:rPr lang="en-US" dirty="0">
-                <a:hlinkClick r:id="rId3"/>
-              </a:rPr>
-              <a:t>https://github.com/Priyaa84/DSE6300_Project.git</a:t>
-            </a:r>
-            <a:endParaRPr lang="en-US" dirty="0"/>
-          </a:p>
-          <a:p>
-            <a:endParaRPr lang="en-US" dirty="0"/>
-          </a:p>
-        </p:txBody>
-      </p:sp>
+      </p:pic>
     </p:spTree>
     <p:extLst>
       <p:ext uri="{BB962C8B-B14F-4D97-AF65-F5344CB8AC3E}">
-        <p14:creationId xmlns:p14="http://schemas.microsoft.com/office/powerpoint/2010/main" val="1203262066"/>
+        <p14:creationId xmlns:p14="http://schemas.microsoft.com/office/powerpoint/2010/main" val="787139366"/>
       </p:ext>
     </p:extLst>
   </p:cSld>
@@ -7258,29 +7179,36 @@
         </p:nvSpPr>
         <p:spPr>
           <a:xfrm>
-            <a:off x="1484311" y="685801"/>
-            <a:ext cx="10018713" cy="1339948"/>
+            <a:off x="1638795" y="-23501"/>
+            <a:ext cx="10553205" cy="1174211"/>
           </a:xfrm>
         </p:spPr>
         <p:txBody>
           <a:bodyPr>
-            <a:normAutofit/>
+            <a:noAutofit/>
           </a:bodyPr>
           <a:lstStyle/>
           <a:p>
+            <a:r>
+              <a:rPr lang="en-US" sz="4800" dirty="0" err="1">
+                <a:latin typeface="Times New Roman" panose="02020603050405020304" pitchFamily="18" charset="0"/>
+                <a:cs typeface="Times New Roman" panose="02020603050405020304" pitchFamily="18" charset="0"/>
+              </a:rPr>
+              <a:t>Git</a:t>
+            </a:r>
             <a:r>
               <a:rPr lang="en-US" sz="4800" dirty="0">
                 <a:latin typeface="Times New Roman" panose="02020603050405020304" pitchFamily="18" charset="0"/>
                 <a:cs typeface="Times New Roman" panose="02020603050405020304" pitchFamily="18" charset="0"/>
               </a:rPr>
-              <a:t>Challenges</a:t>
-            </a:r>
-          </a:p>
-        </p:txBody>
-      </p:sp>
-      <p:sp>
-        <p:nvSpPr>
-          <p:cNvPr id="6" name="Slide Number Placeholder 5"/>
+              <a:t> Hub</a:t>
+            </a:r>
+          </a:p>
+        </p:txBody>
+      </p:sp>
+      <p:sp>
+        <p:nvSpPr>
+          <p:cNvPr id="7" name="Slide Number Placeholder 6"/>
           <p:cNvSpPr>
             <a:spLocks noGrp="1"/>
           </p:cNvSpPr>
@@ -7303,14 +7231,14 @@
       </p:sp>
       <p:sp>
         <p:nvSpPr>
-          <p:cNvPr id="4" name="TextBox 3"/>
+          <p:cNvPr id="5" name="TextBox 4"/>
           <p:cNvSpPr txBox="1"/>
           <p:nvPr/>
         </p:nvSpPr>
         <p:spPr>
           <a:xfrm>
-            <a:off x="2349305" y="2588455"/>
-            <a:ext cx="5330305" cy="830997"/>
+            <a:off x="3582542" y="6475622"/>
+            <a:ext cx="6518030" cy="369332"/>
           </a:xfrm>
           <a:prstGeom prst="rect">
             <a:avLst/>
@@ -7318,25 +7246,66 @@
           <a:noFill/>
         </p:spPr>
         <p:txBody>
-          <a:bodyPr wrap="none" rtlCol="0">
+          <a:bodyPr wrap="square" rtlCol="0">
             <a:spAutoFit/>
           </a:bodyPr>
           <a:lstStyle/>
           <a:p>
             <a:r>
-              <a:rPr lang="en-US" sz="4800" dirty="0">
-                <a:latin typeface="Times New Roman" panose="02020603050405020304" pitchFamily="18" charset="0"/>
-                <a:cs typeface="Times New Roman" panose="02020603050405020304" pitchFamily="18" charset="0"/>
+              <a:rPr lang="en-US" dirty="0">
+                <a:hlinkClick r:id="rId2"/>
               </a:rPr>
-              <a:t>Compatibility issues</a:t>
-            </a:r>
-          </a:p>
-        </p:txBody>
-      </p:sp>
+              <a:t>https://github.com/Priyaa84/DSE6300_Project.git</a:t>
+            </a:r>
+            <a:endParaRPr lang="en-US" dirty="0"/>
+          </a:p>
+        </p:txBody>
+      </p:sp>
+      <p:pic>
+        <p:nvPicPr>
+          <p:cNvPr id="2050" name="Picture 2" descr="C:\Users\apitchaikannu\Desktop\Git 1.PNG"/>
+          <p:cNvPicPr>
+            <a:picLocks noChangeAspect="1" noChangeArrowheads="1"/>
+          </p:cNvPicPr>
+          <p:nvPr/>
+        </p:nvPicPr>
+        <p:blipFill>
+          <a:blip r:embed="rId3">
+            <a:extLst>
+              <a:ext uri="{28A0092B-C50C-407E-A947-70E740481C1C}">
+                <a14:useLocalDpi xmlns:a14="http://schemas.microsoft.com/office/drawing/2010/main" val="0"/>
+              </a:ext>
+            </a:extLst>
+          </a:blip>
+          <a:srcRect/>
+          <a:stretch>
+            <a:fillRect/>
+          </a:stretch>
+        </p:blipFill>
+        <p:spPr bwMode="auto">
+          <a:xfrm>
+            <a:off x="2196936" y="1150710"/>
+            <a:ext cx="8621486" cy="5322832"/>
+          </a:xfrm>
+          <a:prstGeom prst="rect">
+            <a:avLst/>
+          </a:prstGeom>
+          <a:noFill/>
+          <a:extLst>
+            <a:ext uri="{909E8E84-426E-40DD-AFC4-6F175D3DCCD1}">
+              <a14:hiddenFill xmlns:a14="http://schemas.microsoft.com/office/drawing/2010/main">
+                <a:solidFill>
+                  <a:srgbClr val="FFFFFF"/>
+                </a:solidFill>
+              </a14:hiddenFill>
+            </a:ext>
+          </a:extLst>
+        </p:spPr>
+      </p:pic>
     </p:spTree>
     <p:extLst>
       <p:ext uri="{BB962C8B-B14F-4D97-AF65-F5344CB8AC3E}">
-        <p14:creationId xmlns:p14="http://schemas.microsoft.com/office/powerpoint/2010/main" val="2475653635"/>
+        <p14:creationId xmlns:p14="http://schemas.microsoft.com/office/powerpoint/2010/main" val="2707269797"/>
       </p:ext>
     </p:extLst>
   </p:cSld>
@@ -7375,8 +7344,8 @@
         </p:nvSpPr>
         <p:spPr>
           <a:xfrm>
-            <a:off x="1484311" y="685801"/>
-            <a:ext cx="10018713" cy="1339948"/>
+            <a:off x="1555669" y="0"/>
+            <a:ext cx="10636332" cy="1339948"/>
           </a:xfrm>
         </p:spPr>
         <p:txBody>
@@ -7390,7 +7359,7 @@
                 <a:latin typeface="Times New Roman" panose="02020603050405020304" pitchFamily="18" charset="0"/>
                 <a:cs typeface="Times New Roman" panose="02020603050405020304" pitchFamily="18" charset="0"/>
               </a:rPr>
-              <a:t>Future Goals</a:t>
+              <a:t>Challenges</a:t>
             </a:r>
           </a:p>
         </p:txBody>
@@ -7420,20 +7389,14 @@
       </p:sp>
       <p:sp>
         <p:nvSpPr>
-          <p:cNvPr id="3" name="TextBox 2">
-            <a:extLst>
-              <a:ext uri="{FF2B5EF4-FFF2-40B4-BE49-F238E27FC236}">
-                <a16:creationId xmlns:a16="http://schemas.microsoft.com/office/drawing/2014/main" id="{E8E56DEB-1EDF-4218-92F3-85CA8ADE9895}"/>
-              </a:ext>
-            </a:extLst>
-          </p:cNvPr>
+          <p:cNvPr id="4" name="TextBox 3"/>
           <p:cNvSpPr txBox="1"/>
           <p:nvPr/>
         </p:nvSpPr>
         <p:spPr>
           <a:xfrm>
-            <a:off x="2840182" y="2025749"/>
-            <a:ext cx="5915891" cy="954107"/>
+            <a:off x="1779289" y="1339948"/>
+            <a:ext cx="5239027" cy="523220"/>
           </a:xfrm>
           <a:prstGeom prst="rect">
             <a:avLst/>
@@ -7446,7 +7409,7 @@
           </a:bodyPr>
           <a:lstStyle/>
           <a:p>
-            <a:pPr marL="285750" indent="-285750">
+            <a:pPr marL="685800" indent="-685800">
               <a:buFont typeface="Arial" panose="020B0604020202020204" pitchFamily="34" charset="0"/>
               <a:buChar char="•"/>
             </a:pPr>
@@ -7455,20 +7418,7 @@
                 <a:latin typeface="Times New Roman" panose="02020603050405020304" pitchFamily="18" charset="0"/>
                 <a:cs typeface="Times New Roman" panose="02020603050405020304" pitchFamily="18" charset="0"/>
               </a:rPr>
-              <a:t>Live database use</a:t>
-            </a:r>
-          </a:p>
-          <a:p>
-            <a:pPr marL="285750" indent="-285750">
-              <a:buFont typeface="Arial" panose="020B0604020202020204" pitchFamily="34" charset="0"/>
-              <a:buChar char="•"/>
-            </a:pPr>
-            <a:r>
-              <a:rPr lang="en-US" sz="2800" dirty="0">
-                <a:latin typeface="Times New Roman" panose="02020603050405020304" pitchFamily="18" charset="0"/>
-                <a:cs typeface="Times New Roman" panose="02020603050405020304" pitchFamily="18" charset="0"/>
-              </a:rPr>
-              <a:t>User interactive application</a:t>
+              <a:t>Compatibility issues</a:t>
             </a:r>
           </a:p>
         </p:txBody>
@@ -7476,7 +7426,7 @@
     </p:spTree>
     <p:extLst>
       <p:ext uri="{BB962C8B-B14F-4D97-AF65-F5344CB8AC3E}">
-        <p14:creationId xmlns:p14="http://schemas.microsoft.com/office/powerpoint/2010/main" val="2856388626"/>
+        <p14:creationId xmlns:p14="http://schemas.microsoft.com/office/powerpoint/2010/main" val="2475653635"/>
       </p:ext>
     </p:extLst>
   </p:cSld>
@@ -7503,6 +7453,163 @@
           <a:chExt cx="0" cy="0"/>
         </a:xfrm>
       </p:grpSpPr>
+      <p:sp>
+        <p:nvSpPr>
+          <p:cNvPr id="2" name="Title 1"/>
+          <p:cNvSpPr>
+            <a:spLocks noGrp="1"/>
+          </p:cNvSpPr>
+          <p:nvPr>
+            <p:ph type="title"/>
+          </p:nvPr>
+        </p:nvSpPr>
+        <p:spPr>
+          <a:xfrm>
+            <a:off x="1555669" y="0"/>
+            <a:ext cx="10636332" cy="1339948"/>
+          </a:xfrm>
+        </p:spPr>
+        <p:txBody>
+          <a:bodyPr>
+            <a:normAutofit/>
+          </a:bodyPr>
+          <a:lstStyle/>
+          <a:p>
+            <a:r>
+              <a:rPr lang="en-US" sz="4800" dirty="0">
+                <a:latin typeface="Times New Roman" panose="02020603050405020304" pitchFamily="18" charset="0"/>
+                <a:cs typeface="Times New Roman" panose="02020603050405020304" pitchFamily="18" charset="0"/>
+              </a:rPr>
+              <a:t>Future Goals and Improvements</a:t>
+            </a:r>
+          </a:p>
+        </p:txBody>
+      </p:sp>
+      <p:sp>
+        <p:nvSpPr>
+          <p:cNvPr id="6" name="Slide Number Placeholder 5"/>
+          <p:cNvSpPr>
+            <a:spLocks noGrp="1"/>
+          </p:cNvSpPr>
+          <p:nvPr>
+            <p:ph type="sldNum" sz="quarter" idx="12"/>
+          </p:nvPr>
+        </p:nvSpPr>
+        <p:spPr/>
+        <p:txBody>
+          <a:bodyPr/>
+          <a:lstStyle/>
+          <a:p>
+            <a:fld id="{126287E9-9858-4616-BEA9-2CF9CC01AF62}" type="slidenum">
+              <a:rPr lang="en-US" smtClean="0"/>
+              <a:t>15</a:t>
+            </a:fld>
+            <a:endParaRPr lang="en-US"/>
+          </a:p>
+        </p:txBody>
+      </p:sp>
+      <p:sp>
+        <p:nvSpPr>
+          <p:cNvPr id="4" name="TextBox 3"/>
+          <p:cNvSpPr txBox="1"/>
+          <p:nvPr/>
+        </p:nvSpPr>
+        <p:spPr>
+          <a:xfrm>
+            <a:off x="1779289" y="1339948"/>
+            <a:ext cx="8546740" cy="1815882"/>
+          </a:xfrm>
+          <a:prstGeom prst="rect">
+            <a:avLst/>
+          </a:prstGeom>
+          <a:noFill/>
+        </p:spPr>
+        <p:txBody>
+          <a:bodyPr wrap="square" rtlCol="0">
+            <a:spAutoFit/>
+          </a:bodyPr>
+          <a:lstStyle/>
+          <a:p>
+            <a:pPr marL="685800" indent="-685800">
+              <a:buFont typeface="Arial" panose="020B0604020202020204" pitchFamily="34" charset="0"/>
+              <a:buChar char="•"/>
+            </a:pPr>
+            <a:r>
+              <a:rPr lang="en-US" sz="2800" dirty="0">
+                <a:latin typeface="Times New Roman" panose="02020603050405020304" pitchFamily="18" charset="0"/>
+                <a:cs typeface="Times New Roman" panose="02020603050405020304" pitchFamily="18" charset="0"/>
+              </a:rPr>
+              <a:t>Live Database Use</a:t>
+            </a:r>
+          </a:p>
+          <a:p>
+            <a:pPr marL="685800" indent="-685800">
+              <a:buFont typeface="Arial" panose="020B0604020202020204" pitchFamily="34" charset="0"/>
+              <a:buChar char="•"/>
+            </a:pPr>
+            <a:r>
+              <a:rPr lang="en-US" sz="2800" dirty="0">
+                <a:latin typeface="Times New Roman" panose="02020603050405020304" pitchFamily="18" charset="0"/>
+                <a:cs typeface="Times New Roman" panose="02020603050405020304" pitchFamily="18" charset="0"/>
+              </a:rPr>
+              <a:t>Optimize model to improve timing</a:t>
+            </a:r>
+          </a:p>
+          <a:p>
+            <a:pPr marL="685800" indent="-685800">
+              <a:buFont typeface="Arial" panose="020B0604020202020204" pitchFamily="34" charset="0"/>
+              <a:buChar char="•"/>
+            </a:pPr>
+            <a:r>
+              <a:rPr lang="en-US" sz="2800" dirty="0">
+                <a:latin typeface="Times New Roman" panose="02020603050405020304" pitchFamily="18" charset="0"/>
+                <a:cs typeface="Times New Roman" panose="02020603050405020304" pitchFamily="18" charset="0"/>
+              </a:rPr>
+              <a:t>User interactive interface and application</a:t>
+            </a:r>
+          </a:p>
+          <a:p>
+            <a:pPr marL="685800" indent="-685800">
+              <a:buFont typeface="Arial" panose="020B0604020202020204" pitchFamily="34" charset="0"/>
+              <a:buChar char="•"/>
+            </a:pPr>
+            <a:endParaRPr lang="en-US" sz="2800" dirty="0">
+              <a:latin typeface="Times New Roman" panose="02020603050405020304" pitchFamily="18" charset="0"/>
+              <a:cs typeface="Times New Roman" panose="02020603050405020304" pitchFamily="18" charset="0"/>
+            </a:endParaRPr>
+          </a:p>
+        </p:txBody>
+      </p:sp>
+    </p:spTree>
+    <p:extLst>
+      <p:ext uri="{BB962C8B-B14F-4D97-AF65-F5344CB8AC3E}">
+        <p14:creationId xmlns:p14="http://schemas.microsoft.com/office/powerpoint/2010/main" val="231897295"/>
+      </p:ext>
+    </p:extLst>
+  </p:cSld>
+  <p:clrMapOvr>
+    <a:masterClrMapping/>
+  </p:clrMapOvr>
+</p:sld>
+</file>
+
+<file path=ppt/slides/slide16.xml><?xml version="1.0" encoding="utf-8"?>
+<p:sld xmlns:a="http://schemas.openxmlformats.org/drawingml/2006/main" xmlns:r="http://schemas.openxmlformats.org/officeDocument/2006/relationships" xmlns:p="http://schemas.openxmlformats.org/presentationml/2006/main">
+  <p:cSld>
+    <p:spTree>
+      <p:nvGrpSpPr>
+        <p:cNvPr id="1" name=""/>
+        <p:cNvGrpSpPr/>
+        <p:nvPr/>
+      </p:nvGrpSpPr>
+      <p:grpSpPr>
+        <a:xfrm>
+          <a:off x="0" y="0"/>
+          <a:ext cx="0" cy="0"/>
+          <a:chOff x="0" y="0"/>
+          <a:chExt cx="0" cy="0"/>
+        </a:xfrm>
+      </p:grpSpPr>
       <p:pic>
         <p:nvPicPr>
           <p:cNvPr id="4" name="Picture 3"/>
@@ -7511,7 +7618,7 @@
           </p:cNvPicPr>
           <p:nvPr/>
         </p:nvPicPr>
-        <p:blipFill>
+        <p:blipFill rotWithShape="1">
           <a:blip r:embed="rId2">
             <a:extLst>
               <a:ext uri="{28A0092B-C50C-407E-A947-70E740481C1C}">
@@ -7519,14 +7626,13 @@
               </a:ext>
             </a:extLst>
           </a:blip>
-          <a:stretch>
-            <a:fillRect/>
-          </a:stretch>
+          <a:srcRect b="9739"/>
+          <a:stretch/>
         </p:blipFill>
         <p:spPr>
           <a:xfrm>
             <a:off x="1124315" y="1181247"/>
-            <a:ext cx="10210800" cy="4572000"/>
+            <a:ext cx="10210800" cy="4126733"/>
           </a:xfrm>
           <a:prstGeom prst="rect">
             <a:avLst/>
@@ -7550,7 +7656,7 @@
           <a:p>
             <a:fld id="{126287E9-9858-4616-BEA9-2CF9CC01AF62}" type="slidenum">
               <a:rPr lang="en-US" smtClean="0"/>
-              <a:t>15</a:t>
+              <a:t>16</a:t>
             </a:fld>
             <a:endParaRPr lang="en-US"/>
           </a:p>
@@ -7598,8 +7704,40 @@
         </p:nvSpPr>
         <p:spPr>
           <a:xfrm>
-            <a:off x="838200" y="196948"/>
-            <a:ext cx="10515600" cy="493615"/>
+            <a:off x="1277587" y="98693"/>
+            <a:ext cx="10515600" cy="892175"/>
+          </a:xfrm>
+        </p:spPr>
+        <p:txBody>
+          <a:bodyPr>
+            <a:normAutofit/>
+          </a:bodyPr>
+          <a:lstStyle/>
+          <a:p>
+            <a:r>
+              <a:rPr lang="en-US" sz="4800" dirty="0">
+                <a:latin typeface="Times New Roman" panose="02020603050405020304" pitchFamily="18" charset="0"/>
+                <a:cs typeface="Times New Roman" panose="02020603050405020304" pitchFamily="18" charset="0"/>
+              </a:rPr>
+              <a:t>Objective and Workflow</a:t>
+            </a:r>
+          </a:p>
+        </p:txBody>
+      </p:sp>
+      <p:sp>
+        <p:nvSpPr>
+          <p:cNvPr id="3" name="Content Placeholder 2"/>
+          <p:cNvSpPr>
+            <a:spLocks noGrp="1"/>
+          </p:cNvSpPr>
+          <p:nvPr>
+            <p:ph idx="1"/>
+          </p:nvPr>
+        </p:nvSpPr>
+        <p:spPr>
+          <a:xfrm>
+            <a:off x="1277587" y="3331524"/>
+            <a:ext cx="4097977" cy="892175"/>
           </a:xfrm>
         </p:spPr>
         <p:txBody>
@@ -7609,49 +7747,25 @@
           <a:lstStyle/>
           <a:p>
             <a:r>
-              <a:rPr lang="en-US" sz="2800" b="1" dirty="0">
+              <a:rPr lang="en-US" sz="2200" dirty="0">
                 <a:latin typeface="Times New Roman" panose="02020603050405020304" pitchFamily="18" charset="0"/>
                 <a:cs typeface="Times New Roman" panose="02020603050405020304" pitchFamily="18" charset="0"/>
               </a:rPr>
-              <a:t>	STOCK PREDICTION APPLICATION</a:t>
-            </a:r>
-          </a:p>
-        </p:txBody>
-      </p:sp>
-      <p:sp>
-        <p:nvSpPr>
-          <p:cNvPr id="3" name="Content Placeholder 2"/>
-          <p:cNvSpPr>
-            <a:spLocks noGrp="1"/>
-          </p:cNvSpPr>
-          <p:nvPr>
-            <p:ph idx="1"/>
-          </p:nvPr>
-        </p:nvSpPr>
-        <p:spPr>
-          <a:xfrm>
-            <a:off x="838200" y="1409700"/>
-            <a:ext cx="10515600" cy="5337846"/>
-          </a:xfrm>
-        </p:spPr>
-        <p:txBody>
-          <a:bodyPr>
-            <a:normAutofit/>
-          </a:bodyPr>
-          <a:lstStyle/>
-          <a:p>
-            <a:pPr marL="0" indent="0">
-              <a:buNone/>
-            </a:pPr>
-            <a:endParaRPr lang="en-US" dirty="0"/>
-          </a:p>
-          <a:p>
-            <a:pPr marL="0" indent="0">
-              <a:buNone/>
-            </a:pPr>
-            <a:endParaRPr lang="en-US" dirty="0"/>
-          </a:p>
-          <a:p>
+              <a:t>Objective:</a:t>
+            </a:r>
+          </a:p>
+          <a:p>
+            <a:pPr lvl="1"/>
+            <a:r>
+              <a:rPr lang="en-US" dirty="0">
+                <a:latin typeface="Times New Roman" panose="02020603050405020304" pitchFamily="18" charset="0"/>
+                <a:cs typeface="Times New Roman" panose="02020603050405020304" pitchFamily="18" charset="0"/>
+              </a:rPr>
+              <a:t>Aim is to create an application to predict the future values for the user selected stocks</a:t>
+            </a:r>
+          </a:p>
+          <a:p>
+            <a:pPr lvl="1"/>
             <a:endParaRPr lang="en-US" dirty="0"/>
           </a:p>
         </p:txBody>
@@ -7681,7 +7795,13 @@
       </p:sp>
       <p:pic>
         <p:nvPicPr>
-          <p:cNvPr id="4" name="Picture 3"/>
+          <p:cNvPr id="7" name="Picture 6">
+            <a:extLst>
+              <a:ext uri="{FF2B5EF4-FFF2-40B4-BE49-F238E27FC236}">
+                <a16:creationId xmlns:a16="http://schemas.microsoft.com/office/drawing/2014/main" id="{2A7542B9-4E71-2A21-05F1-34C8DA403762}"/>
+              </a:ext>
+            </a:extLst>
+          </p:cNvPr>
           <p:cNvPicPr>
             <a:picLocks noChangeAspect="1"/>
           </p:cNvPicPr>
@@ -7701,62 +7821,18 @@
         </p:blipFill>
         <p:spPr>
           <a:xfrm>
-            <a:off x="3266355" y="1261146"/>
-            <a:ext cx="6048368" cy="5486400"/>
+            <a:off x="5688281" y="1044320"/>
+            <a:ext cx="6300369" cy="5714987"/>
           </a:xfrm>
           <a:prstGeom prst="rect">
             <a:avLst/>
           </a:prstGeom>
         </p:spPr>
       </p:pic>
-      <p:sp>
-        <p:nvSpPr>
-          <p:cNvPr id="5" name="TextBox 4"/>
-          <p:cNvSpPr txBox="1"/>
-          <p:nvPr/>
-        </p:nvSpPr>
-        <p:spPr>
-          <a:xfrm>
-            <a:off x="1645920" y="588466"/>
-            <a:ext cx="9537895" cy="923330"/>
-          </a:xfrm>
-          <a:prstGeom prst="rect">
-            <a:avLst/>
-          </a:prstGeom>
-          <a:noFill/>
-        </p:spPr>
-        <p:txBody>
-          <a:bodyPr wrap="square" rtlCol="0">
-            <a:spAutoFit/>
-          </a:bodyPr>
-          <a:lstStyle/>
-          <a:p>
-            <a:r>
-              <a:rPr lang="en-US" b="1" dirty="0">
-                <a:latin typeface="Times New Roman" panose="02020603050405020304" pitchFamily="18" charset="0"/>
-                <a:cs typeface="Times New Roman" panose="02020603050405020304" pitchFamily="18" charset="0"/>
-              </a:rPr>
-              <a:t>OBJECTIVES:</a:t>
-            </a:r>
-          </a:p>
-          <a:p>
-            <a:r>
-              <a:rPr lang="en-US" dirty="0">
-                <a:latin typeface="Times New Roman" panose="02020603050405020304" pitchFamily="18" charset="0"/>
-                <a:cs typeface="Times New Roman" panose="02020603050405020304" pitchFamily="18" charset="0"/>
-              </a:rPr>
-              <a:t>Aim is to create an application to predict the future values for the user selected stocks</a:t>
-            </a:r>
-          </a:p>
-          <a:p>
-            <a:endParaRPr lang="en-US" dirty="0"/>
-          </a:p>
-        </p:txBody>
-      </p:sp>
     </p:spTree>
     <p:extLst>
       <p:ext uri="{BB962C8B-B14F-4D97-AF65-F5344CB8AC3E}">
-        <p14:creationId xmlns:p14="http://schemas.microsoft.com/office/powerpoint/2010/main" val="1224324947"/>
+        <p14:creationId xmlns:p14="http://schemas.microsoft.com/office/powerpoint/2010/main" val="3087303248"/>
       </p:ext>
     </p:extLst>
   </p:cSld>
@@ -7795,7 +7871,7 @@
         </p:nvSpPr>
         <p:spPr>
           <a:xfrm>
-            <a:off x="838200" y="365125"/>
+            <a:off x="1277587" y="98693"/>
             <a:ext cx="10515600" cy="892175"/>
           </a:xfrm>
         </p:spPr>
@@ -7806,11 +7882,11 @@
           <a:lstStyle/>
           <a:p>
             <a:r>
-              <a:rPr lang="en-US" sz="3600" dirty="0">
+              <a:rPr lang="en-US" sz="4800" dirty="0">
                 <a:latin typeface="Times New Roman" panose="02020603050405020304" pitchFamily="18" charset="0"/>
                 <a:cs typeface="Times New Roman" panose="02020603050405020304" pitchFamily="18" charset="0"/>
               </a:rPr>
-              <a:t>STEPS FOLLOWED</a:t>
+              <a:t>Steps Followed</a:t>
             </a:r>
           </a:p>
         </p:txBody>
@@ -7827,18 +7903,18 @@
         </p:nvSpPr>
         <p:spPr>
           <a:xfrm>
-            <a:off x="838200" y="1409700"/>
-            <a:ext cx="10515600" cy="4767263"/>
+            <a:off x="1364673" y="1562100"/>
+            <a:ext cx="5562600" cy="4767263"/>
           </a:xfrm>
         </p:spPr>
         <p:txBody>
           <a:bodyPr>
-            <a:normAutofit fontScale="32500" lnSpcReduction="20000"/>
+            <a:noAutofit/>
           </a:bodyPr>
           <a:lstStyle/>
           <a:p>
             <a:r>
-              <a:rPr lang="en-US" sz="4500" dirty="0">
+              <a:rPr lang="en-US" sz="2200" dirty="0">
                 <a:latin typeface="Times New Roman" panose="02020603050405020304" pitchFamily="18" charset="0"/>
                 <a:cs typeface="Times New Roman" panose="02020603050405020304" pitchFamily="18" charset="0"/>
               </a:rPr>
@@ -7846,11 +7922,9 @@
             </a:r>
           </a:p>
           <a:p>
-            <a:pPr marL="0" indent="0">
-              <a:buNone/>
-            </a:pPr>
-            <a:r>
-              <a:rPr lang="en-US" sz="4500" dirty="0">
+            <a:pPr lvl="1"/>
+            <a:r>
+              <a:rPr lang="en-US" dirty="0">
                 <a:latin typeface="Times New Roman" panose="02020603050405020304" pitchFamily="18" charset="0"/>
                 <a:cs typeface="Times New Roman" panose="02020603050405020304" pitchFamily="18" charset="0"/>
               </a:rPr>
@@ -7859,13 +7933,13 @@
           </a:p>
           <a:p>
             <a:r>
-              <a:rPr lang="en-US" sz="4500" dirty="0">
+              <a:rPr lang="en-US" sz="2200" dirty="0">
                 <a:latin typeface="Times New Roman" panose="02020603050405020304" pitchFamily="18" charset="0"/>
                 <a:cs typeface="Times New Roman" panose="02020603050405020304" pitchFamily="18" charset="0"/>
               </a:rPr>
               <a:t>Model Prediction:</a:t>
             </a:r>
-            <a:endParaRPr lang="en-US" sz="4500" dirty="0">
+            <a:endParaRPr lang="en-US" sz="2200" dirty="0">
               <a:effectLst/>
               <a:latin typeface="Times New Roman" panose="02020603050405020304" pitchFamily="18" charset="0"/>
               <a:cs typeface="Times New Roman" panose="02020603050405020304" pitchFamily="18" charset="0"/>
@@ -7874,7 +7948,7 @@
           <a:p>
             <a:pPr lvl="1"/>
             <a:r>
-              <a:rPr lang="en-US" sz="4500" dirty="0">
+              <a:rPr lang="en-US" dirty="0">
                 <a:latin typeface="Times New Roman" panose="02020603050405020304" pitchFamily="18" charset="0"/>
                 <a:cs typeface="Times New Roman" panose="02020603050405020304" pitchFamily="18" charset="0"/>
               </a:rPr>
@@ -7884,7 +7958,7 @@
           <a:p>
             <a:pPr lvl="1"/>
             <a:r>
-              <a:rPr lang="en-US" sz="4500" dirty="0">
+              <a:rPr lang="en-US" dirty="0">
                 <a:latin typeface="Times New Roman" panose="02020603050405020304" pitchFamily="18" charset="0"/>
                 <a:cs typeface="Times New Roman" panose="02020603050405020304" pitchFamily="18" charset="0"/>
               </a:rPr>
@@ -7894,7 +7968,7 @@
           <a:p>
             <a:pPr lvl="1"/>
             <a:r>
-              <a:rPr lang="en-US" sz="4500" dirty="0">
+              <a:rPr lang="en-US" dirty="0">
                 <a:latin typeface="Times New Roman" panose="02020603050405020304" pitchFamily="18" charset="0"/>
                 <a:cs typeface="Times New Roman" panose="02020603050405020304" pitchFamily="18" charset="0"/>
               </a:rPr>
@@ -7904,7 +7978,7 @@
           <a:p>
             <a:pPr lvl="1"/>
             <a:r>
-              <a:rPr lang="en-US" sz="4500" dirty="0">
+              <a:rPr lang="en-US" dirty="0">
                 <a:latin typeface="Times New Roman" panose="02020603050405020304" pitchFamily="18" charset="0"/>
                 <a:cs typeface="Times New Roman" panose="02020603050405020304" pitchFamily="18" charset="0"/>
               </a:rPr>
@@ -7914,7 +7988,7 @@
           <a:p>
             <a:pPr lvl="1"/>
             <a:r>
-              <a:rPr lang="en-US" sz="4500" dirty="0">
+              <a:rPr lang="en-US" dirty="0">
                 <a:latin typeface="Times New Roman" panose="02020603050405020304" pitchFamily="18" charset="0"/>
                 <a:cs typeface="Times New Roman" panose="02020603050405020304" pitchFamily="18" charset="0"/>
               </a:rPr>
@@ -7924,7 +7998,7 @@
           <a:p>
             <a:pPr lvl="1"/>
             <a:r>
-              <a:rPr lang="en-US" sz="4500" dirty="0">
+              <a:rPr lang="en-US" dirty="0">
                 <a:latin typeface="Times New Roman" panose="02020603050405020304" pitchFamily="18" charset="0"/>
                 <a:cs typeface="Times New Roman" panose="02020603050405020304" pitchFamily="18" charset="0"/>
               </a:rPr>
@@ -7934,7 +8008,7 @@
           <a:p>
             <a:pPr lvl="1"/>
             <a:r>
-              <a:rPr lang="en-US" sz="4500" dirty="0">
+              <a:rPr lang="en-US" dirty="0">
                 <a:latin typeface="Times New Roman" panose="02020603050405020304" pitchFamily="18" charset="0"/>
                 <a:cs typeface="Times New Roman" panose="02020603050405020304" pitchFamily="18" charset="0"/>
               </a:rPr>
@@ -7944,68 +8018,12 @@
           <a:p>
             <a:pPr lvl="1"/>
             <a:r>
-              <a:rPr lang="en-US" sz="4500" dirty="0">
+              <a:rPr lang="en-US" dirty="0">
                 <a:latin typeface="Times New Roman" panose="02020603050405020304" pitchFamily="18" charset="0"/>
                 <a:cs typeface="Times New Roman" panose="02020603050405020304" pitchFamily="18" charset="0"/>
               </a:rPr>
               <a:t>Plotting the stock price</a:t>
             </a:r>
-          </a:p>
-          <a:p>
-            <a:r>
-              <a:rPr lang="en-US" sz="4500" dirty="0">
-                <a:latin typeface="Times New Roman" panose="02020603050405020304" pitchFamily="18" charset="0"/>
-                <a:cs typeface="Times New Roman" panose="02020603050405020304" pitchFamily="18" charset="0"/>
-              </a:rPr>
-              <a:t>Application deployed :</a:t>
-            </a:r>
-          </a:p>
-          <a:p>
-            <a:pPr marL="0" indent="0">
-              <a:buNone/>
-            </a:pPr>
-            <a:r>
-              <a:rPr lang="en-US" sz="4500" dirty="0">
-                <a:latin typeface="Times New Roman" panose="02020603050405020304" pitchFamily="18" charset="0"/>
-                <a:cs typeface="Times New Roman" panose="02020603050405020304" pitchFamily="18" charset="0"/>
-              </a:rPr>
-              <a:t>Code integrated with flask to build an image and ran it using containers</a:t>
-            </a:r>
-          </a:p>
-          <a:p>
-            <a:r>
-              <a:rPr lang="en-US" sz="4500" dirty="0">
-                <a:latin typeface="Times New Roman" panose="02020603050405020304" pitchFamily="18" charset="0"/>
-                <a:cs typeface="Times New Roman" panose="02020603050405020304" pitchFamily="18" charset="0"/>
-              </a:rPr>
-              <a:t>Application streamed using Kafka:</a:t>
-            </a:r>
-          </a:p>
-          <a:p>
-            <a:pPr marL="0" indent="0">
-              <a:buNone/>
-            </a:pPr>
-            <a:r>
-              <a:rPr lang="en-US" sz="4500" dirty="0">
-                <a:latin typeface="Times New Roman" panose="02020603050405020304" pitchFamily="18" charset="0"/>
-                <a:cs typeface="Times New Roman" panose="02020603050405020304" pitchFamily="18" charset="0"/>
-              </a:rPr>
-              <a:t>Application published and subscribed using Kafka</a:t>
-            </a:r>
-          </a:p>
-          <a:p>
-            <a:pPr marL="0" indent="0">
-              <a:buNone/>
-            </a:pPr>
-            <a:endParaRPr lang="en-US" dirty="0"/>
-          </a:p>
-          <a:p>
-            <a:pPr marL="0" indent="0">
-              <a:buNone/>
-            </a:pPr>
-            <a:endParaRPr lang="en-US" dirty="0"/>
-          </a:p>
-          <a:p>
             <a:endParaRPr lang="en-US" dirty="0"/>
           </a:p>
         </p:txBody>
@@ -8033,10 +8051,321 @@
           </a:p>
         </p:txBody>
       </p:sp>
+      <p:sp>
+        <p:nvSpPr>
+          <p:cNvPr id="5" name="Content Placeholder 2">
+            <a:extLst>
+              <a:ext uri="{FF2B5EF4-FFF2-40B4-BE49-F238E27FC236}">
+                <a16:creationId xmlns:a16="http://schemas.microsoft.com/office/drawing/2014/main" id="{46C19B92-31EC-A0A0-CE39-E615773701D6}"/>
+              </a:ext>
+            </a:extLst>
+          </p:cNvPr>
+          <p:cNvSpPr txBox="1">
+            <a:spLocks/>
+          </p:cNvSpPr>
+          <p:nvPr/>
+        </p:nvSpPr>
+        <p:spPr>
+          <a:xfrm>
+            <a:off x="6927273" y="1045368"/>
+            <a:ext cx="5105400" cy="4767263"/>
+          </a:xfrm>
+          <a:prstGeom prst="rect">
+            <a:avLst/>
+          </a:prstGeom>
+        </p:spPr>
+        <p:txBody>
+          <a:bodyPr vert="horz" lIns="91440" tIns="45720" rIns="91440" bIns="45720" rtlCol="0" anchor="ctr">
+            <a:normAutofit/>
+          </a:bodyPr>
+          <a:lstStyle>
+            <a:lvl1pPr marL="285750" indent="-285750" algn="l" defTabSz="457200" rtl="0" eaLnBrk="1" latinLnBrk="0" hangingPunct="1">
+              <a:spcBef>
+                <a:spcPct val="20000"/>
+              </a:spcBef>
+              <a:spcAft>
+                <a:spcPts val="600"/>
+              </a:spcAft>
+              <a:buClr>
+                <a:schemeClr val="accent1">
+                  <a:lumMod val="75000"/>
+                </a:schemeClr>
+              </a:buClr>
+              <a:buSzPct val="145000"/>
+              <a:buFont typeface="Arial"/>
+              <a:buChar char="•"/>
+              <a:defRPr sz="2400" kern="1200" cap="none">
+                <a:solidFill>
+                  <a:schemeClr val="tx1"/>
+                </a:solidFill>
+                <a:effectLst/>
+                <a:latin typeface="+mn-lt"/>
+                <a:ea typeface="+mn-ea"/>
+                <a:cs typeface="+mn-cs"/>
+              </a:defRPr>
+            </a:lvl1pPr>
+            <a:lvl2pPr marL="742950" indent="-285750" algn="l" defTabSz="457200" rtl="0" eaLnBrk="1" latinLnBrk="0" hangingPunct="1">
+              <a:spcBef>
+                <a:spcPct val="20000"/>
+              </a:spcBef>
+              <a:spcAft>
+                <a:spcPts val="600"/>
+              </a:spcAft>
+              <a:buClr>
+                <a:schemeClr val="accent1">
+                  <a:lumMod val="75000"/>
+                </a:schemeClr>
+              </a:buClr>
+              <a:buSzPct val="145000"/>
+              <a:buFont typeface="Arial"/>
+              <a:buChar char="•"/>
+              <a:defRPr sz="2000" kern="1200" cap="none">
+                <a:solidFill>
+                  <a:schemeClr val="tx1"/>
+                </a:solidFill>
+                <a:effectLst/>
+                <a:latin typeface="+mn-lt"/>
+                <a:ea typeface="+mn-ea"/>
+                <a:cs typeface="+mn-cs"/>
+              </a:defRPr>
+            </a:lvl2pPr>
+            <a:lvl3pPr marL="1200150" indent="-285750" algn="l" defTabSz="457200" rtl="0" eaLnBrk="1" latinLnBrk="0" hangingPunct="1">
+              <a:spcBef>
+                <a:spcPct val="20000"/>
+              </a:spcBef>
+              <a:spcAft>
+                <a:spcPts val="600"/>
+              </a:spcAft>
+              <a:buClr>
+                <a:schemeClr val="accent1">
+                  <a:lumMod val="75000"/>
+                </a:schemeClr>
+              </a:buClr>
+              <a:buSzPct val="145000"/>
+              <a:buFont typeface="Arial"/>
+              <a:buChar char="•"/>
+              <a:defRPr sz="1800" kern="1200" cap="none">
+                <a:solidFill>
+                  <a:schemeClr val="tx1"/>
+                </a:solidFill>
+                <a:effectLst/>
+                <a:latin typeface="+mn-lt"/>
+                <a:ea typeface="+mn-ea"/>
+                <a:cs typeface="+mn-cs"/>
+              </a:defRPr>
+            </a:lvl3pPr>
+            <a:lvl4pPr marL="1543050" indent="-171450" algn="l" defTabSz="457200" rtl="0" eaLnBrk="1" latinLnBrk="0" hangingPunct="1">
+              <a:spcBef>
+                <a:spcPct val="20000"/>
+              </a:spcBef>
+              <a:spcAft>
+                <a:spcPts val="600"/>
+              </a:spcAft>
+              <a:buClr>
+                <a:schemeClr val="accent1">
+                  <a:lumMod val="75000"/>
+                </a:schemeClr>
+              </a:buClr>
+              <a:buSzPct val="145000"/>
+              <a:buFont typeface="Arial"/>
+              <a:buChar char="•"/>
+              <a:defRPr sz="1600" kern="1200" cap="none">
+                <a:solidFill>
+                  <a:schemeClr val="tx1"/>
+                </a:solidFill>
+                <a:effectLst/>
+                <a:latin typeface="+mn-lt"/>
+                <a:ea typeface="+mn-ea"/>
+                <a:cs typeface="+mn-cs"/>
+              </a:defRPr>
+            </a:lvl4pPr>
+            <a:lvl5pPr marL="2000250" indent="-171450" algn="l" defTabSz="457200" rtl="0" eaLnBrk="1" latinLnBrk="0" hangingPunct="1">
+              <a:spcBef>
+                <a:spcPct val="20000"/>
+              </a:spcBef>
+              <a:spcAft>
+                <a:spcPts val="600"/>
+              </a:spcAft>
+              <a:buClr>
+                <a:schemeClr val="accent1">
+                  <a:lumMod val="75000"/>
+                </a:schemeClr>
+              </a:buClr>
+              <a:buSzPct val="145000"/>
+              <a:buFont typeface="Arial"/>
+              <a:buChar char="•"/>
+              <a:defRPr sz="1400" kern="1200" cap="none">
+                <a:solidFill>
+                  <a:schemeClr val="tx1"/>
+                </a:solidFill>
+                <a:effectLst/>
+                <a:latin typeface="+mn-lt"/>
+                <a:ea typeface="+mn-ea"/>
+                <a:cs typeface="+mn-cs"/>
+              </a:defRPr>
+            </a:lvl5pPr>
+            <a:lvl6pPr marL="2514600" indent="-228600" algn="l" defTabSz="457200" rtl="0" eaLnBrk="1" latinLnBrk="0" hangingPunct="1">
+              <a:spcBef>
+                <a:spcPct val="20000"/>
+              </a:spcBef>
+              <a:spcAft>
+                <a:spcPts val="600"/>
+              </a:spcAft>
+              <a:buClr>
+                <a:schemeClr val="accent1">
+                  <a:lumMod val="75000"/>
+                </a:schemeClr>
+              </a:buClr>
+              <a:buSzPct val="145000"/>
+              <a:buFont typeface="Arial"/>
+              <a:buChar char="•"/>
+              <a:defRPr sz="1400" kern="1200" cap="none">
+                <a:solidFill>
+                  <a:schemeClr val="tx1"/>
+                </a:solidFill>
+                <a:effectLst/>
+                <a:latin typeface="+mn-lt"/>
+                <a:ea typeface="+mn-ea"/>
+                <a:cs typeface="+mn-cs"/>
+              </a:defRPr>
+            </a:lvl6pPr>
+            <a:lvl7pPr marL="2971800" indent="-228600" algn="l" defTabSz="457200" rtl="0" eaLnBrk="1" latinLnBrk="0" hangingPunct="1">
+              <a:spcBef>
+                <a:spcPct val="20000"/>
+              </a:spcBef>
+              <a:spcAft>
+                <a:spcPts val="600"/>
+              </a:spcAft>
+              <a:buClr>
+                <a:schemeClr val="accent1">
+                  <a:lumMod val="75000"/>
+                </a:schemeClr>
+              </a:buClr>
+              <a:buSzPct val="145000"/>
+              <a:buFont typeface="Arial"/>
+              <a:buChar char="•"/>
+              <a:defRPr sz="1400" kern="1200" cap="none">
+                <a:solidFill>
+                  <a:schemeClr val="tx1"/>
+                </a:solidFill>
+                <a:effectLst/>
+                <a:latin typeface="+mn-lt"/>
+                <a:ea typeface="+mn-ea"/>
+                <a:cs typeface="+mn-cs"/>
+              </a:defRPr>
+            </a:lvl7pPr>
+            <a:lvl8pPr marL="3429000" indent="-228600" algn="l" defTabSz="457200" rtl="0" eaLnBrk="1" latinLnBrk="0" hangingPunct="1">
+              <a:spcBef>
+                <a:spcPct val="20000"/>
+              </a:spcBef>
+              <a:spcAft>
+                <a:spcPts val="600"/>
+              </a:spcAft>
+              <a:buClr>
+                <a:schemeClr val="accent1">
+                  <a:lumMod val="75000"/>
+                </a:schemeClr>
+              </a:buClr>
+              <a:buSzPct val="145000"/>
+              <a:buFont typeface="Arial"/>
+              <a:buChar char="•"/>
+              <a:defRPr sz="1400" kern="1200" cap="none">
+                <a:solidFill>
+                  <a:schemeClr val="tx1"/>
+                </a:solidFill>
+                <a:effectLst/>
+                <a:latin typeface="+mn-lt"/>
+                <a:ea typeface="+mn-ea"/>
+                <a:cs typeface="+mn-cs"/>
+              </a:defRPr>
+            </a:lvl8pPr>
+            <a:lvl9pPr marL="3886200" indent="-228600" algn="l" defTabSz="457200" rtl="0" eaLnBrk="1" latinLnBrk="0" hangingPunct="1">
+              <a:spcBef>
+                <a:spcPct val="20000"/>
+              </a:spcBef>
+              <a:spcAft>
+                <a:spcPts val="600"/>
+              </a:spcAft>
+              <a:buClr>
+                <a:schemeClr val="accent1">
+                  <a:lumMod val="75000"/>
+                </a:schemeClr>
+              </a:buClr>
+              <a:buSzPct val="145000"/>
+              <a:buFont typeface="Arial"/>
+              <a:buChar char="•"/>
+              <a:defRPr sz="1400" kern="1200" cap="none">
+                <a:solidFill>
+                  <a:schemeClr val="tx1"/>
+                </a:solidFill>
+                <a:effectLst/>
+                <a:latin typeface="+mn-lt"/>
+                <a:ea typeface="+mn-ea"/>
+                <a:cs typeface="+mn-cs"/>
+              </a:defRPr>
+            </a:lvl9pPr>
+          </a:lstStyle>
+          <a:p>
+            <a:r>
+              <a:rPr lang="en-US" dirty="0">
+                <a:latin typeface="Times New Roman" panose="02020603050405020304" pitchFamily="18" charset="0"/>
+                <a:cs typeface="Times New Roman" panose="02020603050405020304" pitchFamily="18" charset="0"/>
+              </a:rPr>
+              <a:t>Application deployed :</a:t>
+            </a:r>
+          </a:p>
+          <a:p>
+            <a:pPr lvl="1"/>
+            <a:r>
+              <a:rPr lang="en-US" dirty="0">
+                <a:latin typeface="Times New Roman" panose="02020603050405020304" pitchFamily="18" charset="0"/>
+                <a:cs typeface="Times New Roman" panose="02020603050405020304" pitchFamily="18" charset="0"/>
+              </a:rPr>
+              <a:t>Code integrated with flask to build an image and ran it using containers</a:t>
+            </a:r>
+          </a:p>
+          <a:p>
+            <a:r>
+              <a:rPr lang="en-US" dirty="0">
+                <a:latin typeface="Times New Roman" panose="02020603050405020304" pitchFamily="18" charset="0"/>
+                <a:cs typeface="Times New Roman" panose="02020603050405020304" pitchFamily="18" charset="0"/>
+              </a:rPr>
+              <a:t>Application streamed using Kafka:</a:t>
+            </a:r>
+          </a:p>
+          <a:p>
+            <a:pPr lvl="1"/>
+            <a:r>
+              <a:rPr lang="en-US" dirty="0">
+                <a:latin typeface="Times New Roman" panose="02020603050405020304" pitchFamily="18" charset="0"/>
+                <a:cs typeface="Times New Roman" panose="02020603050405020304" pitchFamily="18" charset="0"/>
+              </a:rPr>
+              <a:t>Application published and subscribed using Kafka</a:t>
+            </a:r>
+          </a:p>
+          <a:p>
+            <a:pPr marL="0" indent="0">
+              <a:buFont typeface="Arial"/>
+              <a:buNone/>
+            </a:pPr>
+            <a:endParaRPr lang="en-US" sz="2000" dirty="0"/>
+          </a:p>
+          <a:p>
+            <a:pPr marL="0" indent="0">
+              <a:buFont typeface="Arial"/>
+              <a:buNone/>
+            </a:pPr>
+            <a:endParaRPr lang="en-US" sz="2000" dirty="0"/>
+          </a:p>
+          <a:p>
+            <a:endParaRPr lang="en-US" sz="2000" dirty="0"/>
+          </a:p>
+        </p:txBody>
+      </p:sp>
     </p:spTree>
     <p:extLst>
       <p:ext uri="{BB962C8B-B14F-4D97-AF65-F5344CB8AC3E}">
-        <p14:creationId xmlns:p14="http://schemas.microsoft.com/office/powerpoint/2010/main" val="3833640047"/>
+        <p14:creationId xmlns:p14="http://schemas.microsoft.com/office/powerpoint/2010/main" val="2501610389"/>
       </p:ext>
     </p:extLst>
   </p:cSld>
@@ -8075,8 +8404,8 @@
         </p:nvSpPr>
         <p:spPr>
           <a:xfrm>
-            <a:off x="1484311" y="422032"/>
-            <a:ext cx="10018713" cy="1238224"/>
+            <a:off x="1" y="0"/>
+            <a:ext cx="12192000" cy="1238224"/>
           </a:xfrm>
         </p:spPr>
         <p:txBody>
@@ -8086,7 +8415,7 @@
           <a:lstStyle/>
           <a:p>
             <a:r>
-              <a:rPr lang="en-US" sz="4000" dirty="0">
+              <a:rPr lang="en-US" sz="4800" dirty="0">
                 <a:latin typeface="Times New Roman" panose="02020603050405020304" pitchFamily="18" charset="0"/>
                 <a:cs typeface="Times New Roman" panose="02020603050405020304" pitchFamily="18" charset="0"/>
               </a:rPr>
@@ -8189,8 +8518,8 @@
         </p:nvSpPr>
         <p:spPr>
           <a:xfrm>
-            <a:off x="1484311" y="685801"/>
-            <a:ext cx="10018713" cy="1213338"/>
+            <a:off x="249382" y="0"/>
+            <a:ext cx="11942618" cy="1213338"/>
           </a:xfrm>
         </p:spPr>
         <p:txBody>
@@ -8200,7 +8529,7 @@
           <a:lstStyle/>
           <a:p>
             <a:r>
-              <a:rPr lang="en-US" sz="4000" dirty="0">
+              <a:rPr lang="en-US" sz="4800" dirty="0">
                 <a:latin typeface="Times New Roman" panose="02020603050405020304" pitchFamily="18" charset="0"/>
                 <a:cs typeface="Times New Roman" panose="02020603050405020304" pitchFamily="18" charset="0"/>
               </a:rPr>
@@ -8303,8 +8632,8 @@
         </p:nvSpPr>
         <p:spPr>
           <a:xfrm>
-            <a:off x="973015" y="685800"/>
-            <a:ext cx="10530009" cy="1049215"/>
+            <a:off x="0" y="0"/>
+            <a:ext cx="12192000" cy="1199408"/>
           </a:xfrm>
         </p:spPr>
         <p:txBody>
@@ -8314,7 +8643,7 @@
           <a:lstStyle/>
           <a:p>
             <a:r>
-              <a:rPr lang="en-US" sz="3600" dirty="0">
+              <a:rPr lang="en-US" sz="4800" dirty="0">
                 <a:latin typeface="Times New Roman" panose="02020603050405020304" pitchFamily="18" charset="0"/>
                 <a:cs typeface="Times New Roman" panose="02020603050405020304" pitchFamily="18" charset="0"/>
               </a:rPr>
@@ -8431,8 +8760,8 @@
         </p:nvSpPr>
         <p:spPr>
           <a:xfrm>
-            <a:off x="973015" y="685801"/>
-            <a:ext cx="10530009" cy="1014046"/>
+            <a:off x="0" y="0"/>
+            <a:ext cx="12192000" cy="1199408"/>
           </a:xfrm>
         </p:spPr>
         <p:txBody>
@@ -8442,7 +8771,7 @@
           <a:lstStyle/>
           <a:p>
             <a:r>
-              <a:rPr lang="en-US" sz="3600" dirty="0">
+              <a:rPr lang="en-US" sz="4800" dirty="0">
                 <a:latin typeface="Times New Roman" panose="02020603050405020304" pitchFamily="18" charset="0"/>
                 <a:cs typeface="Times New Roman" panose="02020603050405020304" pitchFamily="18" charset="0"/>
               </a:rPr>
@@ -8474,9 +8803,40 @@
           </a:p>
         </p:txBody>
       </p:sp>
+      <p:sp>
+        <p:nvSpPr>
+          <p:cNvPr id="3" name="Content Placeholder 2">
+            <a:extLst>
+              <a:ext uri="{FF2B5EF4-FFF2-40B4-BE49-F238E27FC236}">
+                <a16:creationId xmlns:a16="http://schemas.microsoft.com/office/drawing/2014/main" id="{DE75CC74-6A92-0DF4-519C-1B9A7B6B656F}"/>
+              </a:ext>
+            </a:extLst>
+          </p:cNvPr>
+          <p:cNvSpPr>
+            <a:spLocks noGrp="1"/>
+          </p:cNvSpPr>
+          <p:nvPr>
+            <p:ph idx="1"/>
+          </p:nvPr>
+        </p:nvSpPr>
+        <p:spPr/>
+        <p:txBody>
+          <a:bodyPr/>
+          <a:lstStyle/>
+          <a:p>
+            <a:endParaRPr lang="en-US"/>
+          </a:p>
+        </p:txBody>
+      </p:sp>
       <p:pic>
         <p:nvPicPr>
-          <p:cNvPr id="2051" name="Picture 3" descr="C:\Users\apitchaikannu\Desktop\Capture.PNG"/>
+          <p:cNvPr id="7" name="Picture 3" descr="C:\Users\apitchaikannu\Desktop\Capture.PNG">
+            <a:extLst>
+              <a:ext uri="{FF2B5EF4-FFF2-40B4-BE49-F238E27FC236}">
+                <a16:creationId xmlns:a16="http://schemas.microsoft.com/office/drawing/2014/main" id="{3F3BA990-1A59-5FE4-BD9D-BA2DD4D15210}"/>
+              </a:ext>
+            </a:extLst>
+          </p:cNvPr>
           <p:cNvPicPr>
             <a:picLocks noChangeAspect="1" noChangeArrowheads="1"/>
           </p:cNvPicPr>
@@ -8497,8 +8857,8 @@
         </p:blipFill>
         <p:spPr bwMode="auto">
           <a:xfrm>
-            <a:off x="2219937" y="1715903"/>
-            <a:ext cx="7839208" cy="4114800"/>
+            <a:off x="1376788" y="1199407"/>
+            <a:ext cx="10271285" cy="5391397"/>
           </a:xfrm>
           <a:prstGeom prst="rect">
             <a:avLst/>
@@ -8518,7 +8878,7 @@
     </p:spTree>
     <p:extLst>
       <p:ext uri="{BB962C8B-B14F-4D97-AF65-F5344CB8AC3E}">
-        <p14:creationId xmlns:p14="http://schemas.microsoft.com/office/powerpoint/2010/main" val="3936627792"/>
+        <p14:creationId xmlns:p14="http://schemas.microsoft.com/office/powerpoint/2010/main" val="4172376664"/>
       </p:ext>
     </p:extLst>
   </p:cSld>
@@ -8557,8 +8917,8 @@
         </p:nvSpPr>
         <p:spPr>
           <a:xfrm>
-            <a:off x="973015" y="685801"/>
-            <a:ext cx="10530009" cy="1014046"/>
+            <a:off x="831272" y="0"/>
+            <a:ext cx="11360727" cy="1199408"/>
           </a:xfrm>
         </p:spPr>
         <p:txBody>
@@ -8568,11 +8928,11 @@
           <a:lstStyle/>
           <a:p>
             <a:r>
-              <a:rPr lang="en-US" sz="3600" dirty="0">
+              <a:rPr lang="en-US" dirty="0">
                 <a:latin typeface="Times New Roman" panose="02020603050405020304" pitchFamily="18" charset="0"/>
                 <a:cs typeface="Times New Roman" panose="02020603050405020304" pitchFamily="18" charset="0"/>
               </a:rPr>
-              <a:t>Stock Prediction Application - Kafka prediction </a:t>
+              <a:t>Stock Prediction Application - Kafka Prediction</a:t>
             </a:r>
           </a:p>
         </p:txBody>
@@ -8600,9 +8960,40 @@
           </a:p>
         </p:txBody>
       </p:sp>
+      <p:sp>
+        <p:nvSpPr>
+          <p:cNvPr id="3" name="Content Placeholder 2">
+            <a:extLst>
+              <a:ext uri="{FF2B5EF4-FFF2-40B4-BE49-F238E27FC236}">
+                <a16:creationId xmlns:a16="http://schemas.microsoft.com/office/drawing/2014/main" id="{DE75CC74-6A92-0DF4-519C-1B9A7B6B656F}"/>
+              </a:ext>
+            </a:extLst>
+          </p:cNvPr>
+          <p:cNvSpPr>
+            <a:spLocks noGrp="1"/>
+          </p:cNvSpPr>
+          <p:nvPr>
+            <p:ph idx="1"/>
+          </p:nvPr>
+        </p:nvSpPr>
+        <p:spPr/>
+        <p:txBody>
+          <a:bodyPr/>
+          <a:lstStyle/>
+          <a:p>
+            <a:endParaRPr lang="en-US"/>
+          </a:p>
+        </p:txBody>
+      </p:sp>
       <p:pic>
         <p:nvPicPr>
-          <p:cNvPr id="3" name="Picture 2"/>
+          <p:cNvPr id="8" name="Picture 7">
+            <a:extLst>
+              <a:ext uri="{FF2B5EF4-FFF2-40B4-BE49-F238E27FC236}">
+                <a16:creationId xmlns:a16="http://schemas.microsoft.com/office/drawing/2014/main" id="{5B8DB37E-26FC-AD47-1732-585B58675FAF}"/>
+              </a:ext>
+            </a:extLst>
+          </p:cNvPr>
           <p:cNvPicPr>
             <a:picLocks noChangeAspect="1"/>
           </p:cNvPicPr>
@@ -8622,7 +9013,7 @@
         </p:blipFill>
         <p:spPr>
           <a:xfrm>
-            <a:off x="1571613" y="1660256"/>
+            <a:off x="1803544" y="1295131"/>
             <a:ext cx="9380243" cy="4572000"/>
           </a:xfrm>
           <a:prstGeom prst="rect">
@@ -8633,7 +9024,7 @@
     </p:spTree>
     <p:extLst>
       <p:ext uri="{BB962C8B-B14F-4D97-AF65-F5344CB8AC3E}">
-        <p14:creationId xmlns:p14="http://schemas.microsoft.com/office/powerpoint/2010/main" val="1958570723"/>
+        <p14:creationId xmlns:p14="http://schemas.microsoft.com/office/powerpoint/2010/main" val="1730033731"/>
       </p:ext>
     </p:extLst>
   </p:cSld>
@@ -8672,34 +9063,134 @@
         </p:nvSpPr>
         <p:spPr>
           <a:xfrm>
-            <a:off x="1484311" y="685801"/>
+            <a:off x="4837517" y="339366"/>
             <a:ext cx="10018713" cy="863600"/>
           </a:xfrm>
         </p:spPr>
         <p:txBody>
+          <a:bodyPr>
+            <a:normAutofit/>
+          </a:bodyPr>
+          <a:lstStyle/>
+          <a:p>
+            <a:r>
+              <a:rPr lang="en-US" sz="4800" dirty="0">
+                <a:latin typeface="Times" pitchFamily="2" charset="0"/>
+              </a:rPr>
+              <a:t>MySQL</a:t>
+            </a:r>
+          </a:p>
+        </p:txBody>
+      </p:sp>
+      <p:sp>
+        <p:nvSpPr>
+          <p:cNvPr id="4" name="Slide Number Placeholder 3"/>
+          <p:cNvSpPr>
+            <a:spLocks noGrp="1"/>
+          </p:cNvSpPr>
+          <p:nvPr>
+            <p:ph type="sldNum" sz="quarter" idx="12"/>
+          </p:nvPr>
+        </p:nvSpPr>
+        <p:spPr/>
+        <p:txBody>
           <a:bodyPr/>
           <a:lstStyle/>
           <a:p>
-            <a:r>
-              <a:rPr lang="en-US" dirty="0" err="1"/>
-              <a:t>PySpark</a:t>
-            </a:r>
-            <a:endParaRPr lang="en-US" dirty="0"/>
+            <a:fld id="{126287E9-9858-4616-BEA9-2CF9CC01AF62}" type="slidenum">
+              <a:rPr lang="en-US" smtClean="0"/>
+              <a:t>9</a:t>
+            </a:fld>
+            <a:endParaRPr lang="en-US"/>
           </a:p>
         </p:txBody>
       </p:sp>
       <p:pic>
         <p:nvPicPr>
-          <p:cNvPr id="5" name="Content Placeholder 4"/>
+          <p:cNvPr id="9" name="Picture 8" descr="Graphical user interface, application&#10;&#10;Description automatically generated">
+            <a:extLst>
+              <a:ext uri="{FF2B5EF4-FFF2-40B4-BE49-F238E27FC236}">
+                <a16:creationId xmlns:a16="http://schemas.microsoft.com/office/drawing/2014/main" id="{CE79E4BF-5B05-D7F5-85B2-25F322185328}"/>
+              </a:ext>
+            </a:extLst>
+          </p:cNvPr>
           <p:cNvPicPr>
-            <a:picLocks noGrp="1" noChangeAspect="1"/>
+            <a:picLocks noChangeAspect="1"/>
           </p:cNvPicPr>
-          <p:nvPr>
-            <p:ph idx="1"/>
-          </p:nvPr>
+          <p:nvPr/>
+        </p:nvPicPr>
+        <p:blipFill rotWithShape="1">
+          <a:blip r:embed="rId2">
+            <a:extLst>
+              <a:ext uri="{28A0092B-C50C-407E-A947-70E740481C1C}">
+                <a14:useLocalDpi xmlns:a14="http://schemas.microsoft.com/office/drawing/2010/main" val="0"/>
+              </a:ext>
+            </a:extLst>
+          </a:blip>
+          <a:srcRect b="26001"/>
+          <a:stretch/>
+        </p:blipFill>
+        <p:spPr>
+          <a:xfrm>
+            <a:off x="149861" y="256239"/>
+            <a:ext cx="7855180" cy="3515012"/>
+          </a:xfrm>
+          <a:prstGeom prst="rect">
+            <a:avLst/>
+          </a:prstGeom>
+        </p:spPr>
+      </p:pic>
+      <p:pic>
+        <p:nvPicPr>
+          <p:cNvPr id="13" name="Picture 12" descr="Graphical user interface, text, application&#10;&#10;Description automatically generated">
+            <a:extLst>
+              <a:ext uri="{FF2B5EF4-FFF2-40B4-BE49-F238E27FC236}">
+                <a16:creationId xmlns:a16="http://schemas.microsoft.com/office/drawing/2014/main" id="{2741A4EC-1F50-DAC3-B4C6-A84AF5B6F928}"/>
+              </a:ext>
+            </a:extLst>
+          </p:cNvPr>
+          <p:cNvPicPr>
+            <a:picLocks noChangeAspect="1"/>
+          </p:cNvPicPr>
+          <p:nvPr/>
+        </p:nvPicPr>
+        <p:blipFill rotWithShape="1">
+          <a:blip r:embed="rId3">
+            <a:extLst>
+              <a:ext uri="{28A0092B-C50C-407E-A947-70E740481C1C}">
+                <a14:useLocalDpi xmlns:a14="http://schemas.microsoft.com/office/drawing/2010/main" val="0"/>
+              </a:ext>
+            </a:extLst>
+          </a:blip>
+          <a:srcRect b="33284"/>
+          <a:stretch/>
+        </p:blipFill>
+        <p:spPr>
+          <a:xfrm>
+            <a:off x="3302114" y="4043629"/>
+            <a:ext cx="4702927" cy="2606553"/>
+          </a:xfrm>
+          <a:prstGeom prst="rect">
+            <a:avLst/>
+          </a:prstGeom>
+        </p:spPr>
+      </p:pic>
+      <p:pic>
+        <p:nvPicPr>
+          <p:cNvPr id="16" name="Picture 15" descr="Graphical user interface, table&#10;&#10;Description automatically generated">
+            <a:extLst>
+              <a:ext uri="{FF2B5EF4-FFF2-40B4-BE49-F238E27FC236}">
+                <a16:creationId xmlns:a16="http://schemas.microsoft.com/office/drawing/2014/main" id="{A760D5D9-7A7A-47AC-09C2-9E2BC242821E}"/>
+              </a:ext>
+            </a:extLst>
+          </p:cNvPr>
+          <p:cNvPicPr>
+            <a:picLocks noChangeAspect="1"/>
+          </p:cNvPicPr>
+          <p:nvPr/>
         </p:nvPicPr>
         <p:blipFill>
-          <a:blip r:embed="rId2">
+          <a:blip r:embed="rId4">
             <a:extLst>
               <a:ext uri="{28A0092B-C50C-407E-A947-70E740481C1C}">
                 <a14:useLocalDpi xmlns:a14="http://schemas.microsoft.com/office/drawing/2010/main" val="0"/>
@@ -8712,58 +9203,8 @@
         </p:blipFill>
         <p:spPr>
           <a:xfrm>
-            <a:off x="369404" y="1234696"/>
-            <a:ext cx="5029200" cy="3182894"/>
-          </a:xfrm>
-        </p:spPr>
-      </p:pic>
-      <p:sp>
-        <p:nvSpPr>
-          <p:cNvPr id="4" name="Slide Number Placeholder 3"/>
-          <p:cNvSpPr>
-            <a:spLocks noGrp="1"/>
-          </p:cNvSpPr>
-          <p:nvPr>
-            <p:ph type="sldNum" sz="quarter" idx="12"/>
-          </p:nvPr>
-        </p:nvSpPr>
-        <p:spPr/>
-        <p:txBody>
-          <a:bodyPr/>
-          <a:lstStyle/>
-          <a:p>
-            <a:fld id="{126287E9-9858-4616-BEA9-2CF9CC01AF62}" type="slidenum">
-              <a:rPr lang="en-US" smtClean="0"/>
-              <a:t>9</a:t>
-            </a:fld>
-            <a:endParaRPr lang="en-US"/>
-          </a:p>
-        </p:txBody>
-      </p:sp>
-      <p:pic>
-        <p:nvPicPr>
-          <p:cNvPr id="6" name="Picture 5"/>
-          <p:cNvPicPr>
-            <a:picLocks noChangeAspect="1"/>
-          </p:cNvPicPr>
-          <p:nvPr/>
-        </p:nvPicPr>
-        <p:blipFill>
-          <a:blip r:embed="rId3">
-            <a:extLst>
-              <a:ext uri="{28A0092B-C50C-407E-A947-70E740481C1C}">
-                <a14:useLocalDpi xmlns:a14="http://schemas.microsoft.com/office/drawing/2010/main" val="0"/>
-              </a:ext>
-            </a:extLst>
-          </a:blip>
-          <a:stretch>
-            <a:fillRect/>
-          </a:stretch>
-        </p:blipFill>
-        <p:spPr>
-          <a:xfrm>
-            <a:off x="5539280" y="3675888"/>
-            <a:ext cx="6518821" cy="3182112"/>
+            <a:off x="8174122" y="2319484"/>
+            <a:ext cx="3868017" cy="4330698"/>
           </a:xfrm>
           <a:prstGeom prst="rect">
             <a:avLst/>

</xml_diff>